<commit_message>
Add DataModel to presentation
</commit_message>
<xml_diff>
--- a/exercise2/Exercise_02_Presentation.pptx
+++ b/exercise2/Exercise_02_Presentation.pptx
@@ -20,14 +20,16 @@
     <p:sldId id="263" r:id="rId16"/>
     <p:sldId id="264" r:id="rId17"/>
     <p:sldId id="265" r:id="rId18"/>
+    <p:sldId id="266" r:id="rId19"/>
+    <p:sldId id="267" r:id="rId20"/>
   </p:sldIdLst>
   <p:sldSz cy="5143500" cx="9144000"/>
   <p:notesSz cx="6858000" cy="9144000"/>
   <p:embeddedFontLst>
     <p:embeddedFont>
       <p:font typeface="Gill Sans"/>
-      <p:regular r:id="rId19"/>
-      <p:bold r:id="rId20"/>
+      <p:regular r:id="rId21"/>
+      <p:bold r:id="rId22"/>
     </p:embeddedFont>
   </p:embeddedFontLst>
   <p:defaultTextStyle>
@@ -898,7 +900,7 @@
   <p:cSld>
     <p:spTree>
       <p:nvGrpSpPr>
-        <p:cNvPr id="218" name="Shape 218"/>
+        <p:cNvPr id="217" name="Shape 217"/>
         <p:cNvGrpSpPr/>
         <p:nvPr/>
       </p:nvGrpSpPr>
@@ -912,7 +914,205 @@
       </p:grpSpPr>
       <p:sp>
         <p:nvSpPr>
-          <p:cNvPr id="219" name="Google Shape;219;g874ee7f4f0_2_277:notes"/>
+          <p:cNvPr id="218" name="Google Shape;218;g874ee7f4f0_0_55:notes"/>
+          <p:cNvSpPr/>
+          <p:nvPr>
+            <p:ph idx="2" type="sldImg"/>
+          </p:nvPr>
+        </p:nvSpPr>
+        <p:spPr>
+          <a:xfrm>
+            <a:off x="381300" y="685800"/>
+            <a:ext cx="6096000" cy="3429000"/>
+          </a:xfrm>
+          <a:custGeom>
+            <a:rect b="b" l="l" r="r" t="t"/>
+            <a:pathLst>
+              <a:path extrusionOk="0" h="120000" w="120000">
+                <a:moveTo>
+                  <a:pt x="0" y="0"/>
+                </a:moveTo>
+                <a:lnTo>
+                  <a:pt x="120000" y="0"/>
+                </a:lnTo>
+                <a:lnTo>
+                  <a:pt x="120000" y="120000"/>
+                </a:lnTo>
+                <a:lnTo>
+                  <a:pt x="0" y="120000"/>
+                </a:lnTo>
+                <a:close/>
+              </a:path>
+            </a:pathLst>
+          </a:custGeom>
+        </p:spPr>
+      </p:sp>
+      <p:sp>
+        <p:nvSpPr>
+          <p:cNvPr id="219" name="Google Shape;219;g874ee7f4f0_0_55:notes"/>
+          <p:cNvSpPr txBox="1"/>
+          <p:nvPr>
+            <p:ph idx="1" type="body"/>
+          </p:nvPr>
+        </p:nvSpPr>
+        <p:spPr>
+          <a:xfrm>
+            <a:off x="685800" y="4343400"/>
+            <a:ext cx="5486400" cy="4114800"/>
+          </a:xfrm>
+          <a:prstGeom prst="rect">
+            <a:avLst/>
+          </a:prstGeom>
+        </p:spPr>
+        <p:txBody>
+          <a:bodyPr anchorCtr="0" anchor="t" bIns="91425" lIns="91425" spcFirstLastPara="1" rIns="91425" wrap="square" tIns="91425">
+            <a:noAutofit/>
+          </a:bodyPr>
+          <a:lstStyle/>
+          <a:p>
+            <a:pPr indent="0" lvl="0" marL="0" rtl="0" algn="l">
+              <a:spcBef>
+                <a:spcPts val="0"/>
+              </a:spcBef>
+              <a:spcAft>
+                <a:spcPts val="0"/>
+              </a:spcAft>
+              <a:buNone/>
+            </a:pPr>
+            <a:r>
+              <a:t/>
+            </a:r>
+            <a:endParaRPr/>
+          </a:p>
+        </p:txBody>
+      </p:sp>
+    </p:spTree>
+  </p:cSld>
+  <p:clrMapOvr>
+    <a:masterClrMapping/>
+  </p:clrMapOvr>
+</p:notes>
+</file>
+
+<file path=ppt/notesSlides/notesSlide11.xml><?xml version="1.0" encoding="utf-8"?>
+<p:notes xmlns:a="http://schemas.openxmlformats.org/drawingml/2006/main" xmlns:r="http://schemas.openxmlformats.org/officeDocument/2006/relationships" xmlns:mc="http://schemas.openxmlformats.org/markup-compatibility/2006" xmlns:mv="urn:schemas-microsoft-com:mac:vml" xmlns:p="http://schemas.openxmlformats.org/presentationml/2006/main" xmlns:c="http://schemas.openxmlformats.org/drawingml/2006/chart" xmlns:dgm="http://schemas.openxmlformats.org/drawingml/2006/diagram" xmlns:o="urn:schemas-microsoft-com:office:office" xmlns:v="urn:schemas-microsoft-com:vml" xmlns:pvml="urn:schemas-microsoft-com:office:powerpoint" xmlns:com="http://schemas.openxmlformats.org/drawingml/2006/compatibility" xmlns:p14="http://schemas.microsoft.com/office/powerpoint/2010/main" xmlns:p15="http://schemas.microsoft.com/office/powerpoint/2012/main" showMasterPhAnim="0" showMasterSp="0">
+  <p:cSld>
+    <p:spTree>
+      <p:nvGrpSpPr>
+        <p:cNvPr id="223" name="Shape 223"/>
+        <p:cNvGrpSpPr/>
+        <p:nvPr/>
+      </p:nvGrpSpPr>
+      <p:grpSpPr>
+        <a:xfrm>
+          <a:off x="0" y="0"/>
+          <a:ext cx="0" cy="0"/>
+          <a:chOff x="0" y="0"/>
+          <a:chExt cx="0" cy="0"/>
+        </a:xfrm>
+      </p:grpSpPr>
+      <p:sp>
+        <p:nvSpPr>
+          <p:cNvPr id="224" name="Google Shape;224;g874ee7f4f0_0_60:notes"/>
+          <p:cNvSpPr/>
+          <p:nvPr>
+            <p:ph idx="2" type="sldImg"/>
+          </p:nvPr>
+        </p:nvSpPr>
+        <p:spPr>
+          <a:xfrm>
+            <a:off x="381300" y="685800"/>
+            <a:ext cx="6096000" cy="3429000"/>
+          </a:xfrm>
+          <a:custGeom>
+            <a:rect b="b" l="l" r="r" t="t"/>
+            <a:pathLst>
+              <a:path extrusionOk="0" h="120000" w="120000">
+                <a:moveTo>
+                  <a:pt x="0" y="0"/>
+                </a:moveTo>
+                <a:lnTo>
+                  <a:pt x="120000" y="0"/>
+                </a:lnTo>
+                <a:lnTo>
+                  <a:pt x="120000" y="120000"/>
+                </a:lnTo>
+                <a:lnTo>
+                  <a:pt x="0" y="120000"/>
+                </a:lnTo>
+                <a:close/>
+              </a:path>
+            </a:pathLst>
+          </a:custGeom>
+        </p:spPr>
+      </p:sp>
+      <p:sp>
+        <p:nvSpPr>
+          <p:cNvPr id="225" name="Google Shape;225;g874ee7f4f0_0_60:notes"/>
+          <p:cNvSpPr txBox="1"/>
+          <p:nvPr>
+            <p:ph idx="1" type="body"/>
+          </p:nvPr>
+        </p:nvSpPr>
+        <p:spPr>
+          <a:xfrm>
+            <a:off x="685800" y="4343400"/>
+            <a:ext cx="5486400" cy="4114800"/>
+          </a:xfrm>
+          <a:prstGeom prst="rect">
+            <a:avLst/>
+          </a:prstGeom>
+        </p:spPr>
+        <p:txBody>
+          <a:bodyPr anchorCtr="0" anchor="t" bIns="91425" lIns="91425" spcFirstLastPara="1" rIns="91425" wrap="square" tIns="91425">
+            <a:noAutofit/>
+          </a:bodyPr>
+          <a:lstStyle/>
+          <a:p>
+            <a:pPr indent="0" lvl="0" marL="0" rtl="0" algn="l">
+              <a:spcBef>
+                <a:spcPts val="0"/>
+              </a:spcBef>
+              <a:spcAft>
+                <a:spcPts val="0"/>
+              </a:spcAft>
+              <a:buNone/>
+            </a:pPr>
+            <a:r>
+              <a:t/>
+            </a:r>
+            <a:endParaRPr/>
+          </a:p>
+        </p:txBody>
+      </p:sp>
+    </p:spTree>
+  </p:cSld>
+  <p:clrMapOvr>
+    <a:masterClrMapping/>
+  </p:clrMapOvr>
+</p:notes>
+</file>
+
+<file path=ppt/notesSlides/notesSlide12.xml><?xml version="1.0" encoding="utf-8"?>
+<p:notes xmlns:a="http://schemas.openxmlformats.org/drawingml/2006/main" xmlns:r="http://schemas.openxmlformats.org/officeDocument/2006/relationships" xmlns:mc="http://schemas.openxmlformats.org/markup-compatibility/2006" xmlns:mv="urn:schemas-microsoft-com:mac:vml" xmlns:p="http://schemas.openxmlformats.org/presentationml/2006/main" xmlns:c="http://schemas.openxmlformats.org/drawingml/2006/chart" xmlns:dgm="http://schemas.openxmlformats.org/drawingml/2006/diagram" xmlns:o="urn:schemas-microsoft-com:office:office" xmlns:v="urn:schemas-microsoft-com:vml" xmlns:pvml="urn:schemas-microsoft-com:office:powerpoint" xmlns:com="http://schemas.openxmlformats.org/drawingml/2006/compatibility" xmlns:p14="http://schemas.microsoft.com/office/powerpoint/2010/main" xmlns:p15="http://schemas.microsoft.com/office/powerpoint/2012/main" showMasterPhAnim="0" showMasterSp="0">
+  <p:cSld>
+    <p:spTree>
+      <p:nvGrpSpPr>
+        <p:cNvPr id="230" name="Shape 230"/>
+        <p:cNvGrpSpPr/>
+        <p:nvPr/>
+      </p:nvGrpSpPr>
+      <p:grpSpPr>
+        <a:xfrm>
+          <a:off x="0" y="0"/>
+          <a:ext cx="0" cy="0"/>
+          <a:chOff x="0" y="0"/>
+          <a:chExt cx="0" cy="0"/>
+        </a:xfrm>
+      </p:grpSpPr>
+      <p:sp>
+        <p:nvSpPr>
+          <p:cNvPr id="231" name="Google Shape;231;g874ee7f4f0_2_277:notes"/>
           <p:cNvSpPr txBox="1"/>
           <p:nvPr>
             <p:ph idx="1" type="body"/>
@@ -951,7 +1151,7 @@
       </p:sp>
       <p:sp>
         <p:nvSpPr>
-          <p:cNvPr id="220" name="Google Shape;220;g874ee7f4f0_2_277:notes"/>
+          <p:cNvPr id="232" name="Google Shape;232;g874ee7f4f0_2_277:notes"/>
           <p:cNvSpPr/>
           <p:nvPr>
             <p:ph idx="2" type="sldImg"/>
@@ -1301,7 +1501,7 @@
   <p:cSld>
     <p:spTree>
       <p:nvGrpSpPr>
-        <p:cNvPr id="178" name="Shape 178"/>
+        <p:cNvPr id="177" name="Shape 177"/>
         <p:cNvGrpSpPr/>
         <p:nvPr/>
       </p:nvGrpSpPr>
@@ -1315,7 +1515,7 @@
       </p:grpSpPr>
       <p:sp>
         <p:nvSpPr>
-          <p:cNvPr id="179" name="Google Shape;179;g874ee7f4f0_0_10:notes"/>
+          <p:cNvPr id="178" name="Google Shape;178;g874ee7f4f0_0_10:notes"/>
           <p:cNvSpPr/>
           <p:nvPr>
             <p:ph idx="2" type="sldImg"/>
@@ -1350,7 +1550,7 @@
       </p:sp>
       <p:sp>
         <p:nvSpPr>
-          <p:cNvPr id="180" name="Google Shape;180;g874ee7f4f0_0_10:notes"/>
+          <p:cNvPr id="179" name="Google Shape;179;g874ee7f4f0_0_10:notes"/>
           <p:cNvSpPr txBox="1"/>
           <p:nvPr>
             <p:ph idx="1" type="body"/>
@@ -1400,7 +1600,7 @@
   <p:cSld>
     <p:spTree>
       <p:nvGrpSpPr>
-        <p:cNvPr id="184" name="Shape 184"/>
+        <p:cNvPr id="183" name="Shape 183"/>
         <p:cNvGrpSpPr/>
         <p:nvPr/>
       </p:nvGrpSpPr>
@@ -1414,7 +1614,7 @@
       </p:grpSpPr>
       <p:sp>
         <p:nvSpPr>
-          <p:cNvPr id="185" name="Google Shape;185;g874ee7f4f0_0_16:notes"/>
+          <p:cNvPr id="184" name="Google Shape;184;g874ee7f4f0_0_16:notes"/>
           <p:cNvSpPr/>
           <p:nvPr>
             <p:ph idx="2" type="sldImg"/>
@@ -1449,7 +1649,7 @@
       </p:sp>
       <p:sp>
         <p:nvSpPr>
-          <p:cNvPr id="186" name="Google Shape;186;g874ee7f4f0_0_16:notes"/>
+          <p:cNvPr id="185" name="Google Shape;185;g874ee7f4f0_0_16:notes"/>
           <p:cNvSpPr txBox="1"/>
           <p:nvPr>
             <p:ph idx="1" type="body"/>
@@ -1499,7 +1699,7 @@
   <p:cSld>
     <p:spTree>
       <p:nvGrpSpPr>
-        <p:cNvPr id="191" name="Shape 191"/>
+        <p:cNvPr id="190" name="Shape 190"/>
         <p:cNvGrpSpPr/>
         <p:nvPr/>
       </p:nvGrpSpPr>
@@ -1513,7 +1713,7 @@
       </p:grpSpPr>
       <p:sp>
         <p:nvSpPr>
-          <p:cNvPr id="192" name="Google Shape;192;g874ee7f4f0_0_22:notes"/>
+          <p:cNvPr id="191" name="Google Shape;191;g874ee7f4f0_0_22:notes"/>
           <p:cNvSpPr/>
           <p:nvPr>
             <p:ph idx="2" type="sldImg"/>
@@ -1548,7 +1748,7 @@
       </p:sp>
       <p:sp>
         <p:nvSpPr>
-          <p:cNvPr id="193" name="Google Shape;193;g874ee7f4f0_0_22:notes"/>
+          <p:cNvPr id="192" name="Google Shape;192;g874ee7f4f0_0_22:notes"/>
           <p:cNvSpPr txBox="1"/>
           <p:nvPr>
             <p:ph idx="1" type="body"/>
@@ -1598,7 +1798,7 @@
   <p:cSld>
     <p:spTree>
       <p:nvGrpSpPr>
-        <p:cNvPr id="198" name="Shape 198"/>
+        <p:cNvPr id="197" name="Shape 197"/>
         <p:cNvGrpSpPr/>
         <p:nvPr/>
       </p:nvGrpSpPr>
@@ -1612,7 +1812,7 @@
       </p:grpSpPr>
       <p:sp>
         <p:nvSpPr>
-          <p:cNvPr id="199" name="Google Shape;199;g874ee7f4f0_0_28:notes"/>
+          <p:cNvPr id="198" name="Google Shape;198;g874ee7f4f0_0_28:notes"/>
           <p:cNvSpPr/>
           <p:nvPr>
             <p:ph idx="2" type="sldImg"/>
@@ -1647,7 +1847,7 @@
       </p:sp>
       <p:sp>
         <p:nvSpPr>
-          <p:cNvPr id="200" name="Google Shape;200;g874ee7f4f0_0_28:notes"/>
+          <p:cNvPr id="199" name="Google Shape;199;g874ee7f4f0_0_28:notes"/>
           <p:cNvSpPr txBox="1"/>
           <p:nvPr>
             <p:ph idx="1" type="body"/>
@@ -1697,7 +1897,7 @@
   <p:cSld>
     <p:spTree>
       <p:nvGrpSpPr>
-        <p:cNvPr id="205" name="Shape 205"/>
+        <p:cNvPr id="204" name="Shape 204"/>
         <p:cNvGrpSpPr/>
         <p:nvPr/>
       </p:nvGrpSpPr>
@@ -1711,7 +1911,7 @@
       </p:grpSpPr>
       <p:sp>
         <p:nvSpPr>
-          <p:cNvPr id="206" name="Google Shape;206;g874ee7f4f0_0_34:notes"/>
+          <p:cNvPr id="205" name="Google Shape;205;g874ee7f4f0_0_34:notes"/>
           <p:cNvSpPr/>
           <p:nvPr>
             <p:ph idx="2" type="sldImg"/>
@@ -1746,7 +1946,7 @@
       </p:sp>
       <p:sp>
         <p:nvSpPr>
-          <p:cNvPr id="207" name="Google Shape;207;g874ee7f4f0_0_34:notes"/>
+          <p:cNvPr id="206" name="Google Shape;206;g874ee7f4f0_0_34:notes"/>
           <p:cNvSpPr txBox="1"/>
           <p:nvPr>
             <p:ph idx="1" type="body"/>
@@ -1796,7 +1996,7 @@
   <p:cSld>
     <p:spTree>
       <p:nvGrpSpPr>
-        <p:cNvPr id="211" name="Shape 211"/>
+        <p:cNvPr id="210" name="Shape 210"/>
         <p:cNvGrpSpPr/>
         <p:nvPr/>
       </p:nvGrpSpPr>
@@ -1810,7 +2010,7 @@
       </p:grpSpPr>
       <p:sp>
         <p:nvSpPr>
-          <p:cNvPr id="212" name="Google Shape;212;g874ee7f4f0_0_44:notes"/>
+          <p:cNvPr id="211" name="Google Shape;211;g874ee7f4f0_0_44:notes"/>
           <p:cNvSpPr/>
           <p:nvPr>
             <p:ph idx="2" type="sldImg"/>
@@ -1845,7 +2045,7 @@
       </p:sp>
       <p:sp>
         <p:nvSpPr>
-          <p:cNvPr id="213" name="Google Shape;213;g874ee7f4f0_0_44:notes"/>
+          <p:cNvPr id="212" name="Google Shape;212;g874ee7f4f0_0_44:notes"/>
           <p:cNvSpPr txBox="1"/>
           <p:nvPr>
             <p:ph idx="1" type="body"/>
@@ -19314,7 +19514,7 @@
     </p:bg>
     <p:spTree>
       <p:nvGrpSpPr>
-        <p:cNvPr id="221" name="Shape 221"/>
+        <p:cNvPr id="220" name="Shape 220"/>
         <p:cNvGrpSpPr/>
         <p:nvPr/>
       </p:nvGrpSpPr>
@@ -19328,7 +19528,423 @@
       </p:grpSpPr>
       <p:sp>
         <p:nvSpPr>
+          <p:cNvPr id="221" name="Google Shape;221;p36"/>
+          <p:cNvSpPr txBox="1"/>
+          <p:nvPr>
+            <p:ph type="title"/>
+          </p:nvPr>
+        </p:nvSpPr>
+        <p:spPr>
+          <a:xfrm>
+            <a:off x="1673402" y="2125944"/>
+            <a:ext cx="5797200" cy="891600"/>
+          </a:xfrm>
+          <a:prstGeom prst="rect">
+            <a:avLst/>
+          </a:prstGeom>
+        </p:spPr>
+        <p:txBody>
+          <a:bodyPr anchorCtr="0" anchor="ctr" bIns="137150" lIns="137150" spcFirstLastPara="1" rIns="137150" wrap="square" tIns="137150">
+            <a:noAutofit/>
+          </a:bodyPr>
+          <a:lstStyle/>
+          <a:p>
+            <a:pPr indent="0" lvl="0" marL="0" rtl="0" algn="ctr">
+              <a:spcBef>
+                <a:spcPts val="0"/>
+              </a:spcBef>
+              <a:spcAft>
+                <a:spcPts val="0"/>
+              </a:spcAft>
+              <a:buNone/>
+            </a:pPr>
+            <a:r>
+              <a:rPr lang="tr"/>
+              <a:t>Data Model</a:t>
+            </a:r>
+            <a:endParaRPr/>
+          </a:p>
+        </p:txBody>
+      </p:sp>
+      <p:sp>
+        <p:nvSpPr>
           <p:cNvPr id="222" name="Google Shape;222;p36"/>
+          <p:cNvSpPr txBox="1"/>
+          <p:nvPr>
+            <p:ph idx="1" type="body"/>
+          </p:nvPr>
+        </p:nvSpPr>
+        <p:spPr>
+          <a:xfrm>
+            <a:off x="1673402" y="2903783"/>
+            <a:ext cx="5797200" cy="2326500"/>
+          </a:xfrm>
+          <a:prstGeom prst="rect">
+            <a:avLst/>
+          </a:prstGeom>
+        </p:spPr>
+        <p:txBody>
+          <a:bodyPr anchorCtr="0" anchor="t" bIns="34275" lIns="68575" spcFirstLastPara="1" rIns="68575" wrap="square" tIns="34275">
+            <a:noAutofit/>
+          </a:bodyPr>
+          <a:lstStyle/>
+          <a:p>
+            <a:pPr indent="0" lvl="0" marL="0" rtl="0" algn="l">
+              <a:spcBef>
+                <a:spcPts val="800"/>
+              </a:spcBef>
+              <a:spcAft>
+                <a:spcPts val="0"/>
+              </a:spcAft>
+              <a:buNone/>
+            </a:pPr>
+            <a:r>
+              <a:t/>
+            </a:r>
+            <a:endParaRPr/>
+          </a:p>
+        </p:txBody>
+      </p:sp>
+    </p:spTree>
+  </p:cSld>
+  <p:clrMapOvr>
+    <a:masterClrMapping/>
+  </p:clrMapOvr>
+</p:sld>
+</file>
+
+<file path=ppt/slides/slide11.xml><?xml version="1.0" encoding="utf-8"?>
+<p:sld xmlns:a="http://schemas.openxmlformats.org/drawingml/2006/main" xmlns:r="http://schemas.openxmlformats.org/officeDocument/2006/relationships" xmlns:mc="http://schemas.openxmlformats.org/markup-compatibility/2006" xmlns:mv="urn:schemas-microsoft-com:mac:vml" xmlns:p="http://schemas.openxmlformats.org/presentationml/2006/main" xmlns:c="http://schemas.openxmlformats.org/drawingml/2006/chart" xmlns:dgm="http://schemas.openxmlformats.org/drawingml/2006/diagram" xmlns:o="urn:schemas-microsoft-com:office:office" xmlns:v="urn:schemas-microsoft-com:vml" xmlns:pvml="urn:schemas-microsoft-com:office:powerpoint" xmlns:com="http://schemas.openxmlformats.org/drawingml/2006/compatibility" xmlns:p14="http://schemas.microsoft.com/office/powerpoint/2010/main" xmlns:p15="http://schemas.microsoft.com/office/powerpoint/2012/main">
+  <p:cSld>
+    <p:bg>
+      <p:bgPr>
+        <a:solidFill>
+          <a:srgbClr val="4472C4"/>
+        </a:solidFill>
+      </p:bgPr>
+    </p:bg>
+    <p:spTree>
+      <p:nvGrpSpPr>
+        <p:cNvPr id="226" name="Shape 226"/>
+        <p:cNvGrpSpPr/>
+        <p:nvPr/>
+      </p:nvGrpSpPr>
+      <p:grpSpPr>
+        <a:xfrm>
+          <a:off x="0" y="0"/>
+          <a:ext cx="0" cy="0"/>
+          <a:chOff x="0" y="0"/>
+          <a:chExt cx="0" cy="0"/>
+        </a:xfrm>
+      </p:grpSpPr>
+      <p:pic>
+        <p:nvPicPr>
+          <p:cNvPr id="227" name="Google Shape;227;p37"/>
+          <p:cNvPicPr preferRelativeResize="0"/>
+          <p:nvPr/>
+        </p:nvPicPr>
+        <p:blipFill>
+          <a:blip r:embed="rId3">
+            <a:alphaModFix/>
+          </a:blip>
+          <a:stretch>
+            <a:fillRect/>
+          </a:stretch>
+        </p:blipFill>
+        <p:spPr>
+          <a:xfrm>
+            <a:off x="39125" y="37075"/>
+            <a:ext cx="4532874" cy="4908520"/>
+          </a:xfrm>
+          <a:prstGeom prst="rect">
+            <a:avLst/>
+          </a:prstGeom>
+          <a:noFill/>
+          <a:ln>
+            <a:noFill/>
+          </a:ln>
+        </p:spPr>
+      </p:pic>
+      <p:pic>
+        <p:nvPicPr>
+          <p:cNvPr id="228" name="Google Shape;228;p37"/>
+          <p:cNvPicPr preferRelativeResize="0"/>
+          <p:nvPr/>
+        </p:nvPicPr>
+        <p:blipFill>
+          <a:blip r:embed="rId4">
+            <a:alphaModFix/>
+          </a:blip>
+          <a:stretch>
+            <a:fillRect/>
+          </a:stretch>
+        </p:blipFill>
+        <p:spPr>
+          <a:xfrm>
+            <a:off x="4705075" y="37075"/>
+            <a:ext cx="4399774" cy="2312425"/>
+          </a:xfrm>
+          <a:prstGeom prst="rect">
+            <a:avLst/>
+          </a:prstGeom>
+          <a:noFill/>
+          <a:ln>
+            <a:noFill/>
+          </a:ln>
+        </p:spPr>
+      </p:pic>
+      <p:pic>
+        <p:nvPicPr>
+          <p:cNvPr id="229" name="Google Shape;229;p37"/>
+          <p:cNvPicPr preferRelativeResize="0"/>
+          <p:nvPr/>
+        </p:nvPicPr>
+        <p:blipFill>
+          <a:blip r:embed="rId5">
+            <a:alphaModFix/>
+          </a:blip>
+          <a:stretch>
+            <a:fillRect/>
+          </a:stretch>
+        </p:blipFill>
+        <p:spPr>
+          <a:xfrm>
+            <a:off x="5683663" y="2401775"/>
+            <a:ext cx="2442600" cy="2687925"/>
+          </a:xfrm>
+          <a:prstGeom prst="rect">
+            <a:avLst/>
+          </a:prstGeom>
+          <a:noFill/>
+          <a:ln>
+            <a:noFill/>
+          </a:ln>
+        </p:spPr>
+      </p:pic>
+    </p:spTree>
+  </p:cSld>
+  <p:clrMapOvr>
+    <a:masterClrMapping/>
+  </p:clrMapOvr>
+  <p:timing>
+    <p:tnLst>
+      <p:par>
+        <p:cTn dur="indefinite" nodeType="tmRoot" restart="never">
+          <p:childTnLst>
+            <p:seq concurrent="1" nextAc="seek">
+              <p:cTn dur="indefinite" id="2" nodeType="mainSeq">
+                <p:childTnLst>
+                  <p:par>
+                    <p:cTn fill="hold">
+                      <p:stCondLst>
+                        <p:cond delay="indefinite"/>
+                      </p:stCondLst>
+                      <p:childTnLst>
+                        <p:par>
+                          <p:cTn fill="hold">
+                            <p:stCondLst>
+                              <p:cond delay="0"/>
+                            </p:stCondLst>
+                            <p:childTnLst>
+                              <p:par>
+                                <p:cTn fill="hold" nodeType="clickEffect" presetClass="entr" presetID="10" presetSubtype="0">
+                                  <p:stCondLst>
+                                    <p:cond delay="0"/>
+                                  </p:stCondLst>
+                                  <p:childTnLst>
+                                    <p:set>
+                                      <p:cBhvr>
+                                        <p:cTn dur="1" fill="hold">
+                                          <p:stCondLst>
+                                            <p:cond delay="0"/>
+                                          </p:stCondLst>
+                                        </p:cTn>
+                                        <p:tgtEl>
+                                          <p:spTgt spid="227"/>
+                                        </p:tgtEl>
+                                        <p:attrNameLst>
+                                          <p:attrName>style.visibility</p:attrName>
+                                        </p:attrNameLst>
+                                      </p:cBhvr>
+                                      <p:to>
+                                        <p:strVal val="visible"/>
+                                      </p:to>
+                                    </p:set>
+                                    <p:animEffect filter="fade" transition="in">
+                                      <p:cBhvr>
+                                        <p:cTn dur="1000"/>
+                                        <p:tgtEl>
+                                          <p:spTgt spid="227"/>
+                                        </p:tgtEl>
+                                      </p:cBhvr>
+                                    </p:animEffect>
+                                  </p:childTnLst>
+                                </p:cTn>
+                              </p:par>
+                            </p:childTnLst>
+                          </p:cTn>
+                        </p:par>
+                      </p:childTnLst>
+                    </p:cTn>
+                  </p:par>
+                  <p:par>
+                    <p:cTn fill="hold">
+                      <p:stCondLst>
+                        <p:cond delay="indefinite"/>
+                      </p:stCondLst>
+                      <p:childTnLst>
+                        <p:par>
+                          <p:cTn fill="hold">
+                            <p:stCondLst>
+                              <p:cond delay="0"/>
+                            </p:stCondLst>
+                            <p:childTnLst>
+                              <p:par>
+                                <p:cTn fill="hold" nodeType="clickEffect" presetClass="entr" presetID="10" presetSubtype="0">
+                                  <p:stCondLst>
+                                    <p:cond delay="0"/>
+                                  </p:stCondLst>
+                                  <p:childTnLst>
+                                    <p:set>
+                                      <p:cBhvr>
+                                        <p:cTn dur="1" fill="hold">
+                                          <p:stCondLst>
+                                            <p:cond delay="0"/>
+                                          </p:stCondLst>
+                                        </p:cTn>
+                                        <p:tgtEl>
+                                          <p:spTgt spid="228"/>
+                                        </p:tgtEl>
+                                        <p:attrNameLst>
+                                          <p:attrName>style.visibility</p:attrName>
+                                        </p:attrNameLst>
+                                      </p:cBhvr>
+                                      <p:to>
+                                        <p:strVal val="visible"/>
+                                      </p:to>
+                                    </p:set>
+                                    <p:animEffect filter="fade" transition="in">
+                                      <p:cBhvr>
+                                        <p:cTn dur="1000"/>
+                                        <p:tgtEl>
+                                          <p:spTgt spid="228"/>
+                                        </p:tgtEl>
+                                      </p:cBhvr>
+                                    </p:animEffect>
+                                  </p:childTnLst>
+                                </p:cTn>
+                              </p:par>
+                            </p:childTnLst>
+                          </p:cTn>
+                        </p:par>
+                      </p:childTnLst>
+                    </p:cTn>
+                  </p:par>
+                  <p:par>
+                    <p:cTn fill="hold">
+                      <p:stCondLst>
+                        <p:cond delay="indefinite"/>
+                      </p:stCondLst>
+                      <p:childTnLst>
+                        <p:par>
+                          <p:cTn fill="hold">
+                            <p:stCondLst>
+                              <p:cond delay="0"/>
+                            </p:stCondLst>
+                            <p:childTnLst>
+                              <p:par>
+                                <p:cTn fill="hold" nodeType="clickEffect" presetClass="entr" presetID="10" presetSubtype="0">
+                                  <p:stCondLst>
+                                    <p:cond delay="0"/>
+                                  </p:stCondLst>
+                                  <p:childTnLst>
+                                    <p:set>
+                                      <p:cBhvr>
+                                        <p:cTn dur="1" fill="hold">
+                                          <p:stCondLst>
+                                            <p:cond delay="0"/>
+                                          </p:stCondLst>
+                                        </p:cTn>
+                                        <p:tgtEl>
+                                          <p:spTgt spid="229"/>
+                                        </p:tgtEl>
+                                        <p:attrNameLst>
+                                          <p:attrName>style.visibility</p:attrName>
+                                        </p:attrNameLst>
+                                      </p:cBhvr>
+                                      <p:to>
+                                        <p:strVal val="visible"/>
+                                      </p:to>
+                                    </p:set>
+                                    <p:animEffect filter="fade" transition="in">
+                                      <p:cBhvr>
+                                        <p:cTn dur="1000"/>
+                                        <p:tgtEl>
+                                          <p:spTgt spid="229"/>
+                                        </p:tgtEl>
+                                      </p:cBhvr>
+                                    </p:animEffect>
+                                  </p:childTnLst>
+                                </p:cTn>
+                              </p:par>
+                            </p:childTnLst>
+                          </p:cTn>
+                        </p:par>
+                      </p:childTnLst>
+                    </p:cTn>
+                  </p:par>
+                </p:childTnLst>
+              </p:cTn>
+              <p:prevCondLst>
+                <p:cond evt="onPrev">
+                  <p:tgtEl>
+                    <p:sldTgt/>
+                  </p:tgtEl>
+                </p:cond>
+              </p:prevCondLst>
+              <p:nextCondLst>
+                <p:cond evt="onNext">
+                  <p:tgtEl>
+                    <p:sldTgt/>
+                  </p:tgtEl>
+                </p:cond>
+              </p:nextCondLst>
+            </p:seq>
+          </p:childTnLst>
+        </p:cTn>
+      </p:par>
+    </p:tnLst>
+  </p:timing>
+</p:sld>
+</file>
+
+<file path=ppt/slides/slide12.xml><?xml version="1.0" encoding="utf-8"?>
+<p:sld xmlns:a="http://schemas.openxmlformats.org/drawingml/2006/main" xmlns:r="http://schemas.openxmlformats.org/officeDocument/2006/relationships" xmlns:mc="http://schemas.openxmlformats.org/markup-compatibility/2006" xmlns:mv="urn:schemas-microsoft-com:mac:vml" xmlns:p="http://schemas.openxmlformats.org/presentationml/2006/main" xmlns:c="http://schemas.openxmlformats.org/drawingml/2006/chart" xmlns:dgm="http://schemas.openxmlformats.org/drawingml/2006/diagram" xmlns:o="urn:schemas-microsoft-com:office:office" xmlns:v="urn:schemas-microsoft-com:vml" xmlns:pvml="urn:schemas-microsoft-com:office:powerpoint" xmlns:com="http://schemas.openxmlformats.org/drawingml/2006/compatibility" xmlns:p14="http://schemas.microsoft.com/office/powerpoint/2010/main" xmlns:p15="http://schemas.microsoft.com/office/powerpoint/2012/main">
+  <p:cSld>
+    <p:bg>
+      <p:bgPr>
+        <a:solidFill>
+          <a:srgbClr val="4472C4"/>
+        </a:solidFill>
+      </p:bgPr>
+    </p:bg>
+    <p:spTree>
+      <p:nvGrpSpPr>
+        <p:cNvPr id="233" name="Shape 233"/>
+        <p:cNvGrpSpPr/>
+        <p:nvPr/>
+      </p:nvGrpSpPr>
+      <p:grpSpPr>
+        <a:xfrm>
+          <a:off x="0" y="0"/>
+          <a:ext cx="0" cy="0"/>
+          <a:chOff x="0" y="0"/>
+          <a:chExt cx="0" cy="0"/>
+        </a:xfrm>
+      </p:grpSpPr>
+      <p:sp>
+        <p:nvSpPr>
+          <p:cNvPr id="234" name="Google Shape;234;p38"/>
           <p:cNvSpPr txBox="1"/>
           <p:nvPr>
             <p:ph type="title"/>
@@ -19388,7 +20004,7 @@
       </p:sp>
       <p:sp>
         <p:nvSpPr>
-          <p:cNvPr id="223" name="Google Shape;223;p36"/>
+          <p:cNvPr id="235" name="Google Shape;235;p38"/>
           <p:cNvSpPr txBox="1"/>
           <p:nvPr>
             <p:ph idx="1" type="body"/>
@@ -19655,7 +20271,7 @@
             <a:tbl>
               <a:tblPr bandRow="1">
                 <a:noFill/>
-                <a:tableStyleId>{610DA520-109A-47EE-8D77-8C09DBB3F4CA}</a:tableStyleId>
+                <a:tableStyleId>{419A634D-4ABC-4E1B-B4DB-EAD01D9779E1}</a:tableStyleId>
               </a:tblPr>
               <a:tblGrid>
                 <a:gridCol w="1948125"/>
@@ -20517,45 +21133,6 @@
           </a:p>
         </p:txBody>
       </p:sp>
-      <p:sp>
-        <p:nvSpPr>
-          <p:cNvPr id="177" name="Google Shape;177;p29"/>
-          <p:cNvSpPr txBox="1"/>
-          <p:nvPr>
-            <p:ph idx="1" type="body"/>
-          </p:nvPr>
-        </p:nvSpPr>
-        <p:spPr>
-          <a:xfrm>
-            <a:off x="1673402" y="2721658"/>
-            <a:ext cx="5797200" cy="2326500"/>
-          </a:xfrm>
-          <a:prstGeom prst="rect">
-            <a:avLst/>
-          </a:prstGeom>
-        </p:spPr>
-        <p:txBody>
-          <a:bodyPr anchorCtr="0" anchor="t" bIns="34275" lIns="68575" spcFirstLastPara="1" rIns="68575" wrap="square" tIns="34275">
-            <a:noAutofit/>
-          </a:bodyPr>
-          <a:lstStyle/>
-          <a:p>
-            <a:pPr indent="0" lvl="0" marL="0" rtl="0" algn="l">
-              <a:spcBef>
-                <a:spcPts val="800"/>
-              </a:spcBef>
-              <a:spcAft>
-                <a:spcPts val="0"/>
-              </a:spcAft>
-              <a:buNone/>
-            </a:pPr>
-            <a:r>
-              <a:t/>
-            </a:r>
-            <a:endParaRPr/>
-          </a:p>
-        </p:txBody>
-      </p:sp>
     </p:spTree>
   </p:cSld>
   <p:clrMapOvr>
@@ -20576,7 +21153,7 @@
     </p:bg>
     <p:spTree>
       <p:nvGrpSpPr>
-        <p:cNvPr id="181" name="Shape 181"/>
+        <p:cNvPr id="180" name="Shape 180"/>
         <p:cNvGrpSpPr/>
         <p:nvPr/>
       </p:nvGrpSpPr>
@@ -20590,7 +21167,7 @@
       </p:grpSpPr>
       <p:sp>
         <p:nvSpPr>
-          <p:cNvPr id="182" name="Google Shape;182;p30"/>
+          <p:cNvPr id="181" name="Google Shape;181;p30"/>
           <p:cNvSpPr txBox="1"/>
           <p:nvPr>
             <p:ph idx="1" type="body"/>
@@ -20629,7 +21206,7 @@
       </p:sp>
       <p:pic>
         <p:nvPicPr>
-          <p:cNvPr id="183" name="Google Shape;183;p30"/>
+          <p:cNvPr id="182" name="Google Shape;182;p30"/>
           <p:cNvPicPr preferRelativeResize="0"/>
           <p:nvPr/>
         </p:nvPicPr>
@@ -20675,7 +21252,7 @@
     </p:bg>
     <p:spTree>
       <p:nvGrpSpPr>
-        <p:cNvPr id="187" name="Shape 187"/>
+        <p:cNvPr id="186" name="Shape 186"/>
         <p:cNvGrpSpPr/>
         <p:nvPr/>
       </p:nvGrpSpPr>
@@ -20689,7 +21266,7 @@
       </p:grpSpPr>
       <p:sp>
         <p:nvSpPr>
-          <p:cNvPr id="188" name="Google Shape;188;p31"/>
+          <p:cNvPr id="187" name="Google Shape;187;p31"/>
           <p:cNvSpPr txBox="1"/>
           <p:nvPr>
             <p:ph type="title"/>
@@ -20728,7 +21305,7 @@
       </p:sp>
       <p:sp>
         <p:nvSpPr>
-          <p:cNvPr id="189" name="Google Shape;189;p31"/>
+          <p:cNvPr id="188" name="Google Shape;188;p31"/>
           <p:cNvSpPr txBox="1"/>
           <p:nvPr>
             <p:ph idx="1" type="body"/>
@@ -20767,7 +21344,7 @@
       </p:sp>
       <p:pic>
         <p:nvPicPr>
-          <p:cNvPr id="190" name="Google Shape;190;p31"/>
+          <p:cNvPr id="189" name="Google Shape;189;p31"/>
           <p:cNvPicPr preferRelativeResize="0"/>
           <p:nvPr/>
         </p:nvPicPr>
@@ -20813,7 +21390,7 @@
     </p:bg>
     <p:spTree>
       <p:nvGrpSpPr>
-        <p:cNvPr id="194" name="Shape 194"/>
+        <p:cNvPr id="193" name="Shape 193"/>
         <p:cNvGrpSpPr/>
         <p:nvPr/>
       </p:nvGrpSpPr>
@@ -20827,7 +21404,7 @@
       </p:grpSpPr>
       <p:sp>
         <p:nvSpPr>
-          <p:cNvPr id="195" name="Google Shape;195;p32"/>
+          <p:cNvPr id="194" name="Google Shape;194;p32"/>
           <p:cNvSpPr txBox="1"/>
           <p:nvPr>
             <p:ph type="title"/>
@@ -20866,7 +21443,7 @@
       </p:sp>
       <p:sp>
         <p:nvSpPr>
-          <p:cNvPr id="196" name="Google Shape;196;p32"/>
+          <p:cNvPr id="195" name="Google Shape;195;p32"/>
           <p:cNvSpPr txBox="1"/>
           <p:nvPr>
             <p:ph idx="1" type="body"/>
@@ -20905,7 +21482,7 @@
       </p:sp>
       <p:pic>
         <p:nvPicPr>
-          <p:cNvPr id="197" name="Google Shape;197;p32"/>
+          <p:cNvPr id="196" name="Google Shape;196;p32"/>
           <p:cNvPicPr preferRelativeResize="0"/>
           <p:nvPr/>
         </p:nvPicPr>
@@ -20951,7 +21528,7 @@
     </p:bg>
     <p:spTree>
       <p:nvGrpSpPr>
-        <p:cNvPr id="201" name="Shape 201"/>
+        <p:cNvPr id="200" name="Shape 200"/>
         <p:cNvGrpSpPr/>
         <p:nvPr/>
       </p:nvGrpSpPr>
@@ -20965,7 +21542,7 @@
       </p:grpSpPr>
       <p:sp>
         <p:nvSpPr>
-          <p:cNvPr id="202" name="Google Shape;202;p33"/>
+          <p:cNvPr id="201" name="Google Shape;201;p33"/>
           <p:cNvSpPr txBox="1"/>
           <p:nvPr>
             <p:ph type="title"/>
@@ -21004,7 +21581,7 @@
       </p:sp>
       <p:sp>
         <p:nvSpPr>
-          <p:cNvPr id="203" name="Google Shape;203;p33"/>
+          <p:cNvPr id="202" name="Google Shape;202;p33"/>
           <p:cNvSpPr txBox="1"/>
           <p:nvPr>
             <p:ph idx="1" type="body"/>
@@ -21043,7 +21620,7 @@
       </p:sp>
       <p:pic>
         <p:nvPicPr>
-          <p:cNvPr id="204" name="Google Shape;204;p33"/>
+          <p:cNvPr id="203" name="Google Shape;203;p33"/>
           <p:cNvPicPr preferRelativeResize="0"/>
           <p:nvPr/>
         </p:nvPicPr>
@@ -21089,7 +21666,7 @@
     </p:bg>
     <p:spTree>
       <p:nvGrpSpPr>
-        <p:cNvPr id="208" name="Shape 208"/>
+        <p:cNvPr id="207" name="Shape 207"/>
         <p:cNvGrpSpPr/>
         <p:nvPr/>
       </p:nvGrpSpPr>
@@ -21103,7 +21680,7 @@
       </p:grpSpPr>
       <p:sp>
         <p:nvSpPr>
-          <p:cNvPr id="209" name="Google Shape;209;p34"/>
+          <p:cNvPr id="208" name="Google Shape;208;p34"/>
           <p:cNvSpPr txBox="1"/>
           <p:nvPr>
             <p:ph type="title"/>
@@ -21143,7 +21720,7 @@
       </p:sp>
       <p:sp>
         <p:nvSpPr>
-          <p:cNvPr id="210" name="Google Shape;210;p34"/>
+          <p:cNvPr id="209" name="Google Shape;209;p34"/>
           <p:cNvSpPr txBox="1"/>
           <p:nvPr>
             <p:ph idx="1" type="body"/>
@@ -21200,7 +21777,7 @@
     </p:bg>
     <p:spTree>
       <p:nvGrpSpPr>
-        <p:cNvPr id="214" name="Shape 214"/>
+        <p:cNvPr id="213" name="Shape 213"/>
         <p:cNvGrpSpPr/>
         <p:nvPr/>
       </p:nvGrpSpPr>
@@ -21214,7 +21791,7 @@
       </p:grpSpPr>
       <p:sp>
         <p:nvSpPr>
-          <p:cNvPr id="215" name="Google Shape;215;p35"/>
+          <p:cNvPr id="214" name="Google Shape;214;p35"/>
           <p:cNvSpPr txBox="1"/>
           <p:nvPr>
             <p:ph type="title"/>
@@ -21253,7 +21830,7 @@
       </p:sp>
       <p:sp>
         <p:nvSpPr>
-          <p:cNvPr id="216" name="Google Shape;216;p35"/>
+          <p:cNvPr id="215" name="Google Shape;215;p35"/>
           <p:cNvSpPr txBox="1"/>
           <p:nvPr>
             <p:ph idx="1" type="body"/>
@@ -21292,7 +21869,7 @@
       </p:sp>
       <p:pic>
         <p:nvPicPr>
-          <p:cNvPr id="217" name="Google Shape;217;p35"/>
+          <p:cNvPr id="216" name="Google Shape;216;p35"/>
           <p:cNvPicPr preferRelativeResize="0"/>
           <p:nvPr/>
         </p:nvPicPr>
@@ -21327,6 +21904,285 @@
 </file>
 
 <file path=ppt/theme/theme1.xml><?xml version="1.0" encoding="utf-8"?>
+<a:theme xmlns:a="http://schemas.openxmlformats.org/drawingml/2006/main" xmlns:r="http://schemas.openxmlformats.org/officeDocument/2006/relationships" name="Simple Light">
+  <a:themeElements>
+    <a:clrScheme name="Simple Light">
+      <a:dk1>
+        <a:srgbClr val="000000"/>
+      </a:dk1>
+      <a:lt1>
+        <a:srgbClr val="FFFFFF"/>
+      </a:lt1>
+      <a:dk2>
+        <a:srgbClr val="595959"/>
+      </a:dk2>
+      <a:lt2>
+        <a:srgbClr val="EEEEEE"/>
+      </a:lt2>
+      <a:accent1>
+        <a:srgbClr val="FFAB40"/>
+      </a:accent1>
+      <a:accent2>
+        <a:srgbClr val="212121"/>
+      </a:accent2>
+      <a:accent3>
+        <a:srgbClr val="78909C"/>
+      </a:accent3>
+      <a:accent4>
+        <a:srgbClr val="FFAB40"/>
+      </a:accent4>
+      <a:accent5>
+        <a:srgbClr val="0097A7"/>
+      </a:accent5>
+      <a:accent6>
+        <a:srgbClr val="EEFF41"/>
+      </a:accent6>
+      <a:hlink>
+        <a:srgbClr val="0097A7"/>
+      </a:hlink>
+      <a:folHlink>
+        <a:srgbClr val="0097A7"/>
+      </a:folHlink>
+    </a:clrScheme>
+    <a:fontScheme name="Office">
+      <a:majorFont>
+        <a:latin typeface="Arial"/>
+        <a:ea typeface=""/>
+        <a:cs typeface=""/>
+        <a:font script="Jpan" typeface="ＭＳ Ｐゴシック"/>
+        <a:font script="Hang" typeface="맑은 고딕"/>
+        <a:font script="Hans" typeface="宋体"/>
+        <a:font script="Hant" typeface="新細明體"/>
+        <a:font script="Arab" typeface="Times New Roman"/>
+        <a:font script="Hebr" typeface="Times New Roman"/>
+        <a:font script="Thai" typeface="Angsana New"/>
+        <a:font script="Ethi" typeface="Nyala"/>
+        <a:font script="Beng" typeface="Vrinda"/>
+        <a:font script="Gujr" typeface="Shruti"/>
+        <a:font script="Khmr" typeface="MoolBoran"/>
+        <a:font script="Knda" typeface="Tunga"/>
+        <a:font script="Guru" typeface="Raavi"/>
+        <a:font script="Cans" typeface="Euphemia"/>
+        <a:font script="Cher" typeface="Plantagenet Cherokee"/>
+        <a:font script="Yiii" typeface="Microsoft Yi Baiti"/>
+        <a:font script="Tibt" typeface="Microsoft Himalaya"/>
+        <a:font script="Thaa" typeface="MV Boli"/>
+        <a:font script="Deva" typeface="Mangal"/>
+        <a:font script="Telu" typeface="Gautami"/>
+        <a:font script="Taml" typeface="Latha"/>
+        <a:font script="Syrc" typeface="Estrangelo Edessa"/>
+        <a:font script="Orya" typeface="Kalinga"/>
+        <a:font script="Mlym" typeface="Kartika"/>
+        <a:font script="Laoo" typeface="DokChampa"/>
+        <a:font script="Sinh" typeface="Iskoola Pota"/>
+        <a:font script="Mong" typeface="Mongolian Baiti"/>
+        <a:font script="Viet" typeface="Times New Roman"/>
+        <a:font script="Uigh" typeface="Microsoft Uighur"/>
+        <a:font script="Geor" typeface="Sylfaen"/>
+      </a:majorFont>
+      <a:minorFont>
+        <a:latin typeface="Arial"/>
+        <a:ea typeface=""/>
+        <a:cs typeface=""/>
+        <a:font script="Jpan" typeface="ＭＳ Ｐゴシック"/>
+        <a:font script="Hang" typeface="맑은 고딕"/>
+        <a:font script="Hans" typeface="宋体"/>
+        <a:font script="Hant" typeface="新細明體"/>
+        <a:font script="Arab" typeface="Arial"/>
+        <a:font script="Hebr" typeface="Arial"/>
+        <a:font script="Thai" typeface="Cordia New"/>
+        <a:font script="Ethi" typeface="Nyala"/>
+        <a:font script="Beng" typeface="Vrinda"/>
+        <a:font script="Gujr" typeface="Shruti"/>
+        <a:font script="Khmr" typeface="DaunPenh"/>
+        <a:font script="Knda" typeface="Tunga"/>
+        <a:font script="Guru" typeface="Raavi"/>
+        <a:font script="Cans" typeface="Euphemia"/>
+        <a:font script="Cher" typeface="Plantagenet Cherokee"/>
+        <a:font script="Yiii" typeface="Microsoft Yi Baiti"/>
+        <a:font script="Tibt" typeface="Microsoft Himalaya"/>
+        <a:font script="Thaa" typeface="MV Boli"/>
+        <a:font script="Deva" typeface="Mangal"/>
+        <a:font script="Telu" typeface="Gautami"/>
+        <a:font script="Taml" typeface="Latha"/>
+        <a:font script="Syrc" typeface="Estrangelo Edessa"/>
+        <a:font script="Orya" typeface="Kalinga"/>
+        <a:font script="Mlym" typeface="Kartika"/>
+        <a:font script="Laoo" typeface="DokChampa"/>
+        <a:font script="Sinh" typeface="Iskoola Pota"/>
+        <a:font script="Mong" typeface="Mongolian Baiti"/>
+        <a:font script="Viet" typeface="Arial"/>
+        <a:font script="Uigh" typeface="Microsoft Uighur"/>
+        <a:font script="Geor" typeface="Sylfaen"/>
+      </a:minorFont>
+    </a:fontScheme>
+    <a:fmtScheme name="Office">
+      <a:fillStyleLst>
+        <a:solidFill>
+          <a:schemeClr val="phClr"/>
+        </a:solidFill>
+        <a:gradFill rotWithShape="1">
+          <a:gsLst>
+            <a:gs pos="0">
+              <a:schemeClr val="phClr">
+                <a:tint val="50000"/>
+                <a:satMod val="300000"/>
+              </a:schemeClr>
+            </a:gs>
+            <a:gs pos="35000">
+              <a:schemeClr val="phClr">
+                <a:tint val="37000"/>
+                <a:satMod val="300000"/>
+              </a:schemeClr>
+            </a:gs>
+            <a:gs pos="100000">
+              <a:schemeClr val="phClr">
+                <a:tint val="15000"/>
+                <a:satMod val="350000"/>
+              </a:schemeClr>
+            </a:gs>
+          </a:gsLst>
+          <a:lin ang="16200000" scaled="1"/>
+        </a:gradFill>
+        <a:gradFill rotWithShape="1">
+          <a:gsLst>
+            <a:gs pos="0">
+              <a:schemeClr val="phClr">
+                <a:tint val="100000"/>
+                <a:shade val="100000"/>
+                <a:satMod val="130000"/>
+              </a:schemeClr>
+            </a:gs>
+            <a:gs pos="100000">
+              <a:schemeClr val="phClr">
+                <a:tint val="50000"/>
+                <a:shade val="100000"/>
+                <a:satMod val="350000"/>
+              </a:schemeClr>
+            </a:gs>
+          </a:gsLst>
+          <a:lin ang="16200000" scaled="0"/>
+        </a:gradFill>
+      </a:fillStyleLst>
+      <a:lnStyleLst>
+        <a:ln w="9525" cap="flat" cmpd="sng" algn="ctr">
+          <a:solidFill>
+            <a:schemeClr val="phClr">
+              <a:shade val="95000"/>
+              <a:satMod val="105000"/>
+            </a:schemeClr>
+          </a:solidFill>
+          <a:prstDash val="solid"/>
+        </a:ln>
+        <a:ln w="25400" cap="flat" cmpd="sng" algn="ctr">
+          <a:solidFill>
+            <a:schemeClr val="phClr"/>
+          </a:solidFill>
+          <a:prstDash val="solid"/>
+        </a:ln>
+        <a:ln w="38100" cap="flat" cmpd="sng" algn="ctr">
+          <a:solidFill>
+            <a:schemeClr val="phClr"/>
+          </a:solidFill>
+          <a:prstDash val="solid"/>
+        </a:ln>
+      </a:lnStyleLst>
+      <a:effectStyleLst>
+        <a:effectStyle>
+          <a:effectLst>
+            <a:outerShdw blurRad="40000" dist="20000" dir="5400000" rotWithShape="0">
+              <a:srgbClr val="000000">
+                <a:alpha val="38000"/>
+              </a:srgbClr>
+            </a:outerShdw>
+          </a:effectLst>
+        </a:effectStyle>
+        <a:effectStyle>
+          <a:effectLst>
+            <a:outerShdw blurRad="40000" dist="23000" dir="5400000" rotWithShape="0">
+              <a:srgbClr val="000000">
+                <a:alpha val="35000"/>
+              </a:srgbClr>
+            </a:outerShdw>
+          </a:effectLst>
+        </a:effectStyle>
+        <a:effectStyle>
+          <a:effectLst>
+            <a:outerShdw blurRad="40000" dist="23000" dir="5400000" rotWithShape="0">
+              <a:srgbClr val="000000">
+                <a:alpha val="35000"/>
+              </a:srgbClr>
+            </a:outerShdw>
+          </a:effectLst>
+          <a:scene3d>
+            <a:camera prst="orthographicFront">
+              <a:rot lat="0" lon="0" rev="0"/>
+            </a:camera>
+            <a:lightRig rig="threePt" dir="t">
+              <a:rot lat="0" lon="0" rev="1200000"/>
+            </a:lightRig>
+          </a:scene3d>
+          <a:sp3d>
+            <a:bevelT w="63500" h="25400"/>
+          </a:sp3d>
+        </a:effectStyle>
+      </a:effectStyleLst>
+      <a:bgFillStyleLst>
+        <a:solidFill>
+          <a:schemeClr val="phClr"/>
+        </a:solidFill>
+        <a:gradFill rotWithShape="1">
+          <a:gsLst>
+            <a:gs pos="0">
+              <a:schemeClr val="phClr">
+                <a:tint val="40000"/>
+                <a:satMod val="350000"/>
+              </a:schemeClr>
+            </a:gs>
+            <a:gs pos="40000">
+              <a:schemeClr val="phClr">
+                <a:tint val="45000"/>
+                <a:shade val="99000"/>
+                <a:satMod val="350000"/>
+              </a:schemeClr>
+            </a:gs>
+            <a:gs pos="100000">
+              <a:schemeClr val="phClr">
+                <a:shade val="20000"/>
+                <a:satMod val="255000"/>
+              </a:schemeClr>
+            </a:gs>
+          </a:gsLst>
+          <a:path path="circle">
+            <a:fillToRect l="50000" t="-80000" r="50000" b="180000"/>
+          </a:path>
+        </a:gradFill>
+        <a:gradFill rotWithShape="1">
+          <a:gsLst>
+            <a:gs pos="0">
+              <a:schemeClr val="phClr">
+                <a:tint val="80000"/>
+                <a:satMod val="300000"/>
+              </a:schemeClr>
+            </a:gs>
+            <a:gs pos="100000">
+              <a:schemeClr val="phClr">
+                <a:shade val="30000"/>
+                <a:satMod val="200000"/>
+              </a:schemeClr>
+            </a:gs>
+          </a:gsLst>
+          <a:path path="circle">
+            <a:fillToRect l="50000" t="50000" r="50000" b="50000"/>
+          </a:path>
+        </a:gradFill>
+      </a:bgFillStyleLst>
+    </a:fmtScheme>
+  </a:themeElements>
+</a:theme>
+</file>
+
+<file path=ppt/theme/theme2.xml><?xml version="1.0" encoding="utf-8"?>
 <a:theme xmlns:a="http://schemas.openxmlformats.org/drawingml/2006/main" xmlns:r="http://schemas.openxmlformats.org/officeDocument/2006/relationships" name="Colis">
   <a:themeElements>
     <a:clrScheme name="Office">
@@ -21605,7 +22461,7 @@
 </a:theme>
 </file>
 
-<file path=ppt/theme/theme2.xml><?xml version="1.0" encoding="utf-8"?>
+<file path=ppt/theme/theme3.xml><?xml version="1.0" encoding="utf-8"?>
 <a:theme xmlns:a="http://schemas.openxmlformats.org/drawingml/2006/main" xmlns:r="http://schemas.openxmlformats.org/officeDocument/2006/relationships">
   <a:themeElements>
     <a:clrScheme name="Default">
@@ -21884,7 +22740,7 @@
 </a:theme>
 </file>
 
-<file path=ppt/theme/theme3.xml><?xml version="1.0" encoding="utf-8"?>
+<file path=ppt/theme/theme4.xml><?xml version="1.0" encoding="utf-8"?>
 <a:theme xmlns:a="http://schemas.openxmlformats.org/drawingml/2006/main" xmlns:r="http://schemas.openxmlformats.org/officeDocument/2006/relationships" name="Colis">
   <a:themeElements>
     <a:clrScheme name="Office">
@@ -22161,283 +23017,4 @@
     </a:fmtScheme>
   </a:themeElements>
 </a:theme>
-</file>
-
-<file path=ppt/theme/theme4.xml><?xml version="1.0" encoding="utf-8"?>
-<a:theme xmlns:a="http://schemas.openxmlformats.org/drawingml/2006/main" xmlns:r="http://schemas.openxmlformats.org/officeDocument/2006/relationships" name="Simple Light">
-  <a:themeElements>
-    <a:clrScheme name="Simple Light">
-      <a:dk1>
-        <a:srgbClr val="000000"/>
-      </a:dk1>
-      <a:lt1>
-        <a:srgbClr val="FFFFFF"/>
-      </a:lt1>
-      <a:dk2>
-        <a:srgbClr val="595959"/>
-      </a:dk2>
-      <a:lt2>
-        <a:srgbClr val="EEEEEE"/>
-      </a:lt2>
-      <a:accent1>
-        <a:srgbClr val="FFAB40"/>
-      </a:accent1>
-      <a:accent2>
-        <a:srgbClr val="212121"/>
-      </a:accent2>
-      <a:accent3>
-        <a:srgbClr val="78909C"/>
-      </a:accent3>
-      <a:accent4>
-        <a:srgbClr val="FFAB40"/>
-      </a:accent4>
-      <a:accent5>
-        <a:srgbClr val="0097A7"/>
-      </a:accent5>
-      <a:accent6>
-        <a:srgbClr val="EEFF41"/>
-      </a:accent6>
-      <a:hlink>
-        <a:srgbClr val="0097A7"/>
-      </a:hlink>
-      <a:folHlink>
-        <a:srgbClr val="0097A7"/>
-      </a:folHlink>
-    </a:clrScheme>
-    <a:fontScheme name="Office">
-      <a:majorFont>
-        <a:latin typeface="Arial"/>
-        <a:ea typeface=""/>
-        <a:cs typeface=""/>
-        <a:font script="Jpan" typeface="ＭＳ Ｐゴシック"/>
-        <a:font script="Hang" typeface="맑은 고딕"/>
-        <a:font script="Hans" typeface="宋体"/>
-        <a:font script="Hant" typeface="新細明體"/>
-        <a:font script="Arab" typeface="Times New Roman"/>
-        <a:font script="Hebr" typeface="Times New Roman"/>
-        <a:font script="Thai" typeface="Angsana New"/>
-        <a:font script="Ethi" typeface="Nyala"/>
-        <a:font script="Beng" typeface="Vrinda"/>
-        <a:font script="Gujr" typeface="Shruti"/>
-        <a:font script="Khmr" typeface="MoolBoran"/>
-        <a:font script="Knda" typeface="Tunga"/>
-        <a:font script="Guru" typeface="Raavi"/>
-        <a:font script="Cans" typeface="Euphemia"/>
-        <a:font script="Cher" typeface="Plantagenet Cherokee"/>
-        <a:font script="Yiii" typeface="Microsoft Yi Baiti"/>
-        <a:font script="Tibt" typeface="Microsoft Himalaya"/>
-        <a:font script="Thaa" typeface="MV Boli"/>
-        <a:font script="Deva" typeface="Mangal"/>
-        <a:font script="Telu" typeface="Gautami"/>
-        <a:font script="Taml" typeface="Latha"/>
-        <a:font script="Syrc" typeface="Estrangelo Edessa"/>
-        <a:font script="Orya" typeface="Kalinga"/>
-        <a:font script="Mlym" typeface="Kartika"/>
-        <a:font script="Laoo" typeface="DokChampa"/>
-        <a:font script="Sinh" typeface="Iskoola Pota"/>
-        <a:font script="Mong" typeface="Mongolian Baiti"/>
-        <a:font script="Viet" typeface="Times New Roman"/>
-        <a:font script="Uigh" typeface="Microsoft Uighur"/>
-        <a:font script="Geor" typeface="Sylfaen"/>
-      </a:majorFont>
-      <a:minorFont>
-        <a:latin typeface="Arial"/>
-        <a:ea typeface=""/>
-        <a:cs typeface=""/>
-        <a:font script="Jpan" typeface="ＭＳ Ｐゴシック"/>
-        <a:font script="Hang" typeface="맑은 고딕"/>
-        <a:font script="Hans" typeface="宋体"/>
-        <a:font script="Hant" typeface="新細明體"/>
-        <a:font script="Arab" typeface="Arial"/>
-        <a:font script="Hebr" typeface="Arial"/>
-        <a:font script="Thai" typeface="Cordia New"/>
-        <a:font script="Ethi" typeface="Nyala"/>
-        <a:font script="Beng" typeface="Vrinda"/>
-        <a:font script="Gujr" typeface="Shruti"/>
-        <a:font script="Khmr" typeface="DaunPenh"/>
-        <a:font script="Knda" typeface="Tunga"/>
-        <a:font script="Guru" typeface="Raavi"/>
-        <a:font script="Cans" typeface="Euphemia"/>
-        <a:font script="Cher" typeface="Plantagenet Cherokee"/>
-        <a:font script="Yiii" typeface="Microsoft Yi Baiti"/>
-        <a:font script="Tibt" typeface="Microsoft Himalaya"/>
-        <a:font script="Thaa" typeface="MV Boli"/>
-        <a:font script="Deva" typeface="Mangal"/>
-        <a:font script="Telu" typeface="Gautami"/>
-        <a:font script="Taml" typeface="Latha"/>
-        <a:font script="Syrc" typeface="Estrangelo Edessa"/>
-        <a:font script="Orya" typeface="Kalinga"/>
-        <a:font script="Mlym" typeface="Kartika"/>
-        <a:font script="Laoo" typeface="DokChampa"/>
-        <a:font script="Sinh" typeface="Iskoola Pota"/>
-        <a:font script="Mong" typeface="Mongolian Baiti"/>
-        <a:font script="Viet" typeface="Arial"/>
-        <a:font script="Uigh" typeface="Microsoft Uighur"/>
-        <a:font script="Geor" typeface="Sylfaen"/>
-      </a:minorFont>
-    </a:fontScheme>
-    <a:fmtScheme name="Office">
-      <a:fillStyleLst>
-        <a:solidFill>
-          <a:schemeClr val="phClr"/>
-        </a:solidFill>
-        <a:gradFill rotWithShape="1">
-          <a:gsLst>
-            <a:gs pos="0">
-              <a:schemeClr val="phClr">
-                <a:tint val="50000"/>
-                <a:satMod val="300000"/>
-              </a:schemeClr>
-            </a:gs>
-            <a:gs pos="35000">
-              <a:schemeClr val="phClr">
-                <a:tint val="37000"/>
-                <a:satMod val="300000"/>
-              </a:schemeClr>
-            </a:gs>
-            <a:gs pos="100000">
-              <a:schemeClr val="phClr">
-                <a:tint val="15000"/>
-                <a:satMod val="350000"/>
-              </a:schemeClr>
-            </a:gs>
-          </a:gsLst>
-          <a:lin ang="16200000" scaled="1"/>
-        </a:gradFill>
-        <a:gradFill rotWithShape="1">
-          <a:gsLst>
-            <a:gs pos="0">
-              <a:schemeClr val="phClr">
-                <a:tint val="100000"/>
-                <a:shade val="100000"/>
-                <a:satMod val="130000"/>
-              </a:schemeClr>
-            </a:gs>
-            <a:gs pos="100000">
-              <a:schemeClr val="phClr">
-                <a:tint val="50000"/>
-                <a:shade val="100000"/>
-                <a:satMod val="350000"/>
-              </a:schemeClr>
-            </a:gs>
-          </a:gsLst>
-          <a:lin ang="16200000" scaled="0"/>
-        </a:gradFill>
-      </a:fillStyleLst>
-      <a:lnStyleLst>
-        <a:ln w="9525" cap="flat" cmpd="sng" algn="ctr">
-          <a:solidFill>
-            <a:schemeClr val="phClr">
-              <a:shade val="95000"/>
-              <a:satMod val="105000"/>
-            </a:schemeClr>
-          </a:solidFill>
-          <a:prstDash val="solid"/>
-        </a:ln>
-        <a:ln w="25400" cap="flat" cmpd="sng" algn="ctr">
-          <a:solidFill>
-            <a:schemeClr val="phClr"/>
-          </a:solidFill>
-          <a:prstDash val="solid"/>
-        </a:ln>
-        <a:ln w="38100" cap="flat" cmpd="sng" algn="ctr">
-          <a:solidFill>
-            <a:schemeClr val="phClr"/>
-          </a:solidFill>
-          <a:prstDash val="solid"/>
-        </a:ln>
-      </a:lnStyleLst>
-      <a:effectStyleLst>
-        <a:effectStyle>
-          <a:effectLst>
-            <a:outerShdw blurRad="40000" dist="20000" dir="5400000" rotWithShape="0">
-              <a:srgbClr val="000000">
-                <a:alpha val="38000"/>
-              </a:srgbClr>
-            </a:outerShdw>
-          </a:effectLst>
-        </a:effectStyle>
-        <a:effectStyle>
-          <a:effectLst>
-            <a:outerShdw blurRad="40000" dist="23000" dir="5400000" rotWithShape="0">
-              <a:srgbClr val="000000">
-                <a:alpha val="35000"/>
-              </a:srgbClr>
-            </a:outerShdw>
-          </a:effectLst>
-        </a:effectStyle>
-        <a:effectStyle>
-          <a:effectLst>
-            <a:outerShdw blurRad="40000" dist="23000" dir="5400000" rotWithShape="0">
-              <a:srgbClr val="000000">
-                <a:alpha val="35000"/>
-              </a:srgbClr>
-            </a:outerShdw>
-          </a:effectLst>
-          <a:scene3d>
-            <a:camera prst="orthographicFront">
-              <a:rot lat="0" lon="0" rev="0"/>
-            </a:camera>
-            <a:lightRig rig="threePt" dir="t">
-              <a:rot lat="0" lon="0" rev="1200000"/>
-            </a:lightRig>
-          </a:scene3d>
-          <a:sp3d>
-            <a:bevelT w="63500" h="25400"/>
-          </a:sp3d>
-        </a:effectStyle>
-      </a:effectStyleLst>
-      <a:bgFillStyleLst>
-        <a:solidFill>
-          <a:schemeClr val="phClr"/>
-        </a:solidFill>
-        <a:gradFill rotWithShape="1">
-          <a:gsLst>
-            <a:gs pos="0">
-              <a:schemeClr val="phClr">
-                <a:tint val="40000"/>
-                <a:satMod val="350000"/>
-              </a:schemeClr>
-            </a:gs>
-            <a:gs pos="40000">
-              <a:schemeClr val="phClr">
-                <a:tint val="45000"/>
-                <a:shade val="99000"/>
-                <a:satMod val="350000"/>
-              </a:schemeClr>
-            </a:gs>
-            <a:gs pos="100000">
-              <a:schemeClr val="phClr">
-                <a:shade val="20000"/>
-                <a:satMod val="255000"/>
-              </a:schemeClr>
-            </a:gs>
-          </a:gsLst>
-          <a:path path="circle">
-            <a:fillToRect l="50000" t="-80000" r="50000" b="180000"/>
-          </a:path>
-        </a:gradFill>
-        <a:gradFill rotWithShape="1">
-          <a:gsLst>
-            <a:gs pos="0">
-              <a:schemeClr val="phClr">
-                <a:tint val="80000"/>
-                <a:satMod val="300000"/>
-              </a:schemeClr>
-            </a:gs>
-            <a:gs pos="100000">
-              <a:schemeClr val="phClr">
-                <a:shade val="30000"/>
-                <a:satMod val="200000"/>
-              </a:schemeClr>
-            </a:gs>
-          </a:gsLst>
-          <a:path path="circle">
-            <a:fillToRect l="50000" t="50000" r="50000" b="50000"/>
-          </a:path>
-        </a:gradFill>
-      </a:bgFillStyleLst>
-    </a:fmtScheme>
-  </a:themeElements>
-</a:theme>
 </file>
</xml_diff>

<commit_message>
Centerize ticket prices on the table
</commit_message>
<xml_diff>
--- a/exercise2/Exercise_02_Presentation.pptx
+++ b/exercise2/Exercise_02_Presentation.pptx
@@ -20271,7 +20271,7 @@
             <a:tbl>
               <a:tblPr bandRow="1">
                 <a:noFill/>
-                <a:tableStyleId>{419A634D-4ABC-4E1B-B4DB-EAD01D9779E1}</a:tableStyleId>
+                <a:tableStyleId>{005D6389-D646-42F0-8AE2-6561EDAFA78D}</a:tableStyleId>
               </a:tblPr>
               <a:tblGrid>
                 <a:gridCol w="1948125"/>
@@ -20325,7 +20325,7 @@
                       <a:endParaRPr sz="1100"/>
                     </a:p>
                   </a:txBody>
-                  <a:tcPr marT="34300" marB="34300" marR="68600" marL="68600">
+                  <a:tcPr marT="34300" marB="34300" marR="68600" marL="68600" anchor="ctr">
                     <a:solidFill>
                       <a:srgbClr val="4472C4"/>
                     </a:solidFill>
@@ -20382,7 +20382,7 @@
                       <a:endParaRPr sz="1100"/>
                     </a:p>
                   </a:txBody>
-                  <a:tcPr marT="34300" marB="34300" marR="68600" marL="68600">
+                  <a:tcPr marT="34300" marB="34300" marR="68600" marL="68600" anchor="ctr">
                     <a:solidFill>
                       <a:srgbClr val="4472C4">
                         <a:alpha val="49803"/>
@@ -20439,7 +20439,7 @@
                       <a:endParaRPr sz="1100"/>
                     </a:p>
                   </a:txBody>
-                  <a:tcPr marT="34300" marB="34300" marR="68600" marL="68600">
+                  <a:tcPr marT="34300" marB="34300" marR="68600" marL="68600" anchor="ctr">
                     <a:solidFill>
                       <a:srgbClr val="4472C4"/>
                     </a:solidFill>
@@ -20496,7 +20496,7 @@
                       <a:endParaRPr sz="1100"/>
                     </a:p>
                   </a:txBody>
-                  <a:tcPr marT="34300" marB="34300" marR="68600" marL="68600">
+                  <a:tcPr marT="34300" marB="34300" marR="68600" marL="68600" anchor="ctr">
                     <a:solidFill>
                       <a:srgbClr val="4472C4">
                         <a:alpha val="49803"/>
@@ -20553,7 +20553,7 @@
                       <a:endParaRPr sz="1100"/>
                     </a:p>
                   </a:txBody>
-                  <a:tcPr marT="34300" marB="34300" marR="68600" marL="68600">
+                  <a:tcPr marT="34300" marB="34300" marR="68600" marL="68600" anchor="ctr">
                     <a:solidFill>
                       <a:srgbClr val="4472C4"/>
                     </a:solidFill>
@@ -21904,285 +21904,6 @@
 </file>
 
 <file path=ppt/theme/theme1.xml><?xml version="1.0" encoding="utf-8"?>
-<a:theme xmlns:a="http://schemas.openxmlformats.org/drawingml/2006/main" xmlns:r="http://schemas.openxmlformats.org/officeDocument/2006/relationships" name="Simple Light">
-  <a:themeElements>
-    <a:clrScheme name="Simple Light">
-      <a:dk1>
-        <a:srgbClr val="000000"/>
-      </a:dk1>
-      <a:lt1>
-        <a:srgbClr val="FFFFFF"/>
-      </a:lt1>
-      <a:dk2>
-        <a:srgbClr val="595959"/>
-      </a:dk2>
-      <a:lt2>
-        <a:srgbClr val="EEEEEE"/>
-      </a:lt2>
-      <a:accent1>
-        <a:srgbClr val="FFAB40"/>
-      </a:accent1>
-      <a:accent2>
-        <a:srgbClr val="212121"/>
-      </a:accent2>
-      <a:accent3>
-        <a:srgbClr val="78909C"/>
-      </a:accent3>
-      <a:accent4>
-        <a:srgbClr val="FFAB40"/>
-      </a:accent4>
-      <a:accent5>
-        <a:srgbClr val="0097A7"/>
-      </a:accent5>
-      <a:accent6>
-        <a:srgbClr val="EEFF41"/>
-      </a:accent6>
-      <a:hlink>
-        <a:srgbClr val="0097A7"/>
-      </a:hlink>
-      <a:folHlink>
-        <a:srgbClr val="0097A7"/>
-      </a:folHlink>
-    </a:clrScheme>
-    <a:fontScheme name="Office">
-      <a:majorFont>
-        <a:latin typeface="Arial"/>
-        <a:ea typeface=""/>
-        <a:cs typeface=""/>
-        <a:font script="Jpan" typeface="ＭＳ Ｐゴシック"/>
-        <a:font script="Hang" typeface="맑은 고딕"/>
-        <a:font script="Hans" typeface="宋体"/>
-        <a:font script="Hant" typeface="新細明體"/>
-        <a:font script="Arab" typeface="Times New Roman"/>
-        <a:font script="Hebr" typeface="Times New Roman"/>
-        <a:font script="Thai" typeface="Angsana New"/>
-        <a:font script="Ethi" typeface="Nyala"/>
-        <a:font script="Beng" typeface="Vrinda"/>
-        <a:font script="Gujr" typeface="Shruti"/>
-        <a:font script="Khmr" typeface="MoolBoran"/>
-        <a:font script="Knda" typeface="Tunga"/>
-        <a:font script="Guru" typeface="Raavi"/>
-        <a:font script="Cans" typeface="Euphemia"/>
-        <a:font script="Cher" typeface="Plantagenet Cherokee"/>
-        <a:font script="Yiii" typeface="Microsoft Yi Baiti"/>
-        <a:font script="Tibt" typeface="Microsoft Himalaya"/>
-        <a:font script="Thaa" typeface="MV Boli"/>
-        <a:font script="Deva" typeface="Mangal"/>
-        <a:font script="Telu" typeface="Gautami"/>
-        <a:font script="Taml" typeface="Latha"/>
-        <a:font script="Syrc" typeface="Estrangelo Edessa"/>
-        <a:font script="Orya" typeface="Kalinga"/>
-        <a:font script="Mlym" typeface="Kartika"/>
-        <a:font script="Laoo" typeface="DokChampa"/>
-        <a:font script="Sinh" typeface="Iskoola Pota"/>
-        <a:font script="Mong" typeface="Mongolian Baiti"/>
-        <a:font script="Viet" typeface="Times New Roman"/>
-        <a:font script="Uigh" typeface="Microsoft Uighur"/>
-        <a:font script="Geor" typeface="Sylfaen"/>
-      </a:majorFont>
-      <a:minorFont>
-        <a:latin typeface="Arial"/>
-        <a:ea typeface=""/>
-        <a:cs typeface=""/>
-        <a:font script="Jpan" typeface="ＭＳ Ｐゴシック"/>
-        <a:font script="Hang" typeface="맑은 고딕"/>
-        <a:font script="Hans" typeface="宋体"/>
-        <a:font script="Hant" typeface="新細明體"/>
-        <a:font script="Arab" typeface="Arial"/>
-        <a:font script="Hebr" typeface="Arial"/>
-        <a:font script="Thai" typeface="Cordia New"/>
-        <a:font script="Ethi" typeface="Nyala"/>
-        <a:font script="Beng" typeface="Vrinda"/>
-        <a:font script="Gujr" typeface="Shruti"/>
-        <a:font script="Khmr" typeface="DaunPenh"/>
-        <a:font script="Knda" typeface="Tunga"/>
-        <a:font script="Guru" typeface="Raavi"/>
-        <a:font script="Cans" typeface="Euphemia"/>
-        <a:font script="Cher" typeface="Plantagenet Cherokee"/>
-        <a:font script="Yiii" typeface="Microsoft Yi Baiti"/>
-        <a:font script="Tibt" typeface="Microsoft Himalaya"/>
-        <a:font script="Thaa" typeface="MV Boli"/>
-        <a:font script="Deva" typeface="Mangal"/>
-        <a:font script="Telu" typeface="Gautami"/>
-        <a:font script="Taml" typeface="Latha"/>
-        <a:font script="Syrc" typeface="Estrangelo Edessa"/>
-        <a:font script="Orya" typeface="Kalinga"/>
-        <a:font script="Mlym" typeface="Kartika"/>
-        <a:font script="Laoo" typeface="DokChampa"/>
-        <a:font script="Sinh" typeface="Iskoola Pota"/>
-        <a:font script="Mong" typeface="Mongolian Baiti"/>
-        <a:font script="Viet" typeface="Arial"/>
-        <a:font script="Uigh" typeface="Microsoft Uighur"/>
-        <a:font script="Geor" typeface="Sylfaen"/>
-      </a:minorFont>
-    </a:fontScheme>
-    <a:fmtScheme name="Office">
-      <a:fillStyleLst>
-        <a:solidFill>
-          <a:schemeClr val="phClr"/>
-        </a:solidFill>
-        <a:gradFill rotWithShape="1">
-          <a:gsLst>
-            <a:gs pos="0">
-              <a:schemeClr val="phClr">
-                <a:tint val="50000"/>
-                <a:satMod val="300000"/>
-              </a:schemeClr>
-            </a:gs>
-            <a:gs pos="35000">
-              <a:schemeClr val="phClr">
-                <a:tint val="37000"/>
-                <a:satMod val="300000"/>
-              </a:schemeClr>
-            </a:gs>
-            <a:gs pos="100000">
-              <a:schemeClr val="phClr">
-                <a:tint val="15000"/>
-                <a:satMod val="350000"/>
-              </a:schemeClr>
-            </a:gs>
-          </a:gsLst>
-          <a:lin ang="16200000" scaled="1"/>
-        </a:gradFill>
-        <a:gradFill rotWithShape="1">
-          <a:gsLst>
-            <a:gs pos="0">
-              <a:schemeClr val="phClr">
-                <a:tint val="100000"/>
-                <a:shade val="100000"/>
-                <a:satMod val="130000"/>
-              </a:schemeClr>
-            </a:gs>
-            <a:gs pos="100000">
-              <a:schemeClr val="phClr">
-                <a:tint val="50000"/>
-                <a:shade val="100000"/>
-                <a:satMod val="350000"/>
-              </a:schemeClr>
-            </a:gs>
-          </a:gsLst>
-          <a:lin ang="16200000" scaled="0"/>
-        </a:gradFill>
-      </a:fillStyleLst>
-      <a:lnStyleLst>
-        <a:ln w="9525" cap="flat" cmpd="sng" algn="ctr">
-          <a:solidFill>
-            <a:schemeClr val="phClr">
-              <a:shade val="95000"/>
-              <a:satMod val="105000"/>
-            </a:schemeClr>
-          </a:solidFill>
-          <a:prstDash val="solid"/>
-        </a:ln>
-        <a:ln w="25400" cap="flat" cmpd="sng" algn="ctr">
-          <a:solidFill>
-            <a:schemeClr val="phClr"/>
-          </a:solidFill>
-          <a:prstDash val="solid"/>
-        </a:ln>
-        <a:ln w="38100" cap="flat" cmpd="sng" algn="ctr">
-          <a:solidFill>
-            <a:schemeClr val="phClr"/>
-          </a:solidFill>
-          <a:prstDash val="solid"/>
-        </a:ln>
-      </a:lnStyleLst>
-      <a:effectStyleLst>
-        <a:effectStyle>
-          <a:effectLst>
-            <a:outerShdw blurRad="40000" dist="20000" dir="5400000" rotWithShape="0">
-              <a:srgbClr val="000000">
-                <a:alpha val="38000"/>
-              </a:srgbClr>
-            </a:outerShdw>
-          </a:effectLst>
-        </a:effectStyle>
-        <a:effectStyle>
-          <a:effectLst>
-            <a:outerShdw blurRad="40000" dist="23000" dir="5400000" rotWithShape="0">
-              <a:srgbClr val="000000">
-                <a:alpha val="35000"/>
-              </a:srgbClr>
-            </a:outerShdw>
-          </a:effectLst>
-        </a:effectStyle>
-        <a:effectStyle>
-          <a:effectLst>
-            <a:outerShdw blurRad="40000" dist="23000" dir="5400000" rotWithShape="0">
-              <a:srgbClr val="000000">
-                <a:alpha val="35000"/>
-              </a:srgbClr>
-            </a:outerShdw>
-          </a:effectLst>
-          <a:scene3d>
-            <a:camera prst="orthographicFront">
-              <a:rot lat="0" lon="0" rev="0"/>
-            </a:camera>
-            <a:lightRig rig="threePt" dir="t">
-              <a:rot lat="0" lon="0" rev="1200000"/>
-            </a:lightRig>
-          </a:scene3d>
-          <a:sp3d>
-            <a:bevelT w="63500" h="25400"/>
-          </a:sp3d>
-        </a:effectStyle>
-      </a:effectStyleLst>
-      <a:bgFillStyleLst>
-        <a:solidFill>
-          <a:schemeClr val="phClr"/>
-        </a:solidFill>
-        <a:gradFill rotWithShape="1">
-          <a:gsLst>
-            <a:gs pos="0">
-              <a:schemeClr val="phClr">
-                <a:tint val="40000"/>
-                <a:satMod val="350000"/>
-              </a:schemeClr>
-            </a:gs>
-            <a:gs pos="40000">
-              <a:schemeClr val="phClr">
-                <a:tint val="45000"/>
-                <a:shade val="99000"/>
-                <a:satMod val="350000"/>
-              </a:schemeClr>
-            </a:gs>
-            <a:gs pos="100000">
-              <a:schemeClr val="phClr">
-                <a:shade val="20000"/>
-                <a:satMod val="255000"/>
-              </a:schemeClr>
-            </a:gs>
-          </a:gsLst>
-          <a:path path="circle">
-            <a:fillToRect l="50000" t="-80000" r="50000" b="180000"/>
-          </a:path>
-        </a:gradFill>
-        <a:gradFill rotWithShape="1">
-          <a:gsLst>
-            <a:gs pos="0">
-              <a:schemeClr val="phClr">
-                <a:tint val="80000"/>
-                <a:satMod val="300000"/>
-              </a:schemeClr>
-            </a:gs>
-            <a:gs pos="100000">
-              <a:schemeClr val="phClr">
-                <a:shade val="30000"/>
-                <a:satMod val="200000"/>
-              </a:schemeClr>
-            </a:gs>
-          </a:gsLst>
-          <a:path path="circle">
-            <a:fillToRect l="50000" t="50000" r="50000" b="50000"/>
-          </a:path>
-        </a:gradFill>
-      </a:bgFillStyleLst>
-    </a:fmtScheme>
-  </a:themeElements>
-</a:theme>
-</file>
-
-<file path=ppt/theme/theme2.xml><?xml version="1.0" encoding="utf-8"?>
 <a:theme xmlns:a="http://schemas.openxmlformats.org/drawingml/2006/main" xmlns:r="http://schemas.openxmlformats.org/officeDocument/2006/relationships" name="Colis">
   <a:themeElements>
     <a:clrScheme name="Office">
@@ -22461,7 +22182,7 @@
 </a:theme>
 </file>
 
-<file path=ppt/theme/theme3.xml><?xml version="1.0" encoding="utf-8"?>
+<file path=ppt/theme/theme2.xml><?xml version="1.0" encoding="utf-8"?>
 <a:theme xmlns:a="http://schemas.openxmlformats.org/drawingml/2006/main" xmlns:r="http://schemas.openxmlformats.org/officeDocument/2006/relationships">
   <a:themeElements>
     <a:clrScheme name="Default">
@@ -22740,7 +22461,7 @@
 </a:theme>
 </file>
 
-<file path=ppt/theme/theme4.xml><?xml version="1.0" encoding="utf-8"?>
+<file path=ppt/theme/theme3.xml><?xml version="1.0" encoding="utf-8"?>
 <a:theme xmlns:a="http://schemas.openxmlformats.org/drawingml/2006/main" xmlns:r="http://schemas.openxmlformats.org/officeDocument/2006/relationships" name="Colis">
   <a:themeElements>
     <a:clrScheme name="Office">
@@ -23017,4 +22738,283 @@
     </a:fmtScheme>
   </a:themeElements>
 </a:theme>
+</file>
+
+<file path=ppt/theme/theme4.xml><?xml version="1.0" encoding="utf-8"?>
+<a:theme xmlns:a="http://schemas.openxmlformats.org/drawingml/2006/main" xmlns:r="http://schemas.openxmlformats.org/officeDocument/2006/relationships" name="Simple Light">
+  <a:themeElements>
+    <a:clrScheme name="Simple Light">
+      <a:dk1>
+        <a:srgbClr val="000000"/>
+      </a:dk1>
+      <a:lt1>
+        <a:srgbClr val="FFFFFF"/>
+      </a:lt1>
+      <a:dk2>
+        <a:srgbClr val="595959"/>
+      </a:dk2>
+      <a:lt2>
+        <a:srgbClr val="EEEEEE"/>
+      </a:lt2>
+      <a:accent1>
+        <a:srgbClr val="FFAB40"/>
+      </a:accent1>
+      <a:accent2>
+        <a:srgbClr val="212121"/>
+      </a:accent2>
+      <a:accent3>
+        <a:srgbClr val="78909C"/>
+      </a:accent3>
+      <a:accent4>
+        <a:srgbClr val="FFAB40"/>
+      </a:accent4>
+      <a:accent5>
+        <a:srgbClr val="0097A7"/>
+      </a:accent5>
+      <a:accent6>
+        <a:srgbClr val="EEFF41"/>
+      </a:accent6>
+      <a:hlink>
+        <a:srgbClr val="0097A7"/>
+      </a:hlink>
+      <a:folHlink>
+        <a:srgbClr val="0097A7"/>
+      </a:folHlink>
+    </a:clrScheme>
+    <a:fontScheme name="Office">
+      <a:majorFont>
+        <a:latin typeface="Arial"/>
+        <a:ea typeface=""/>
+        <a:cs typeface=""/>
+        <a:font script="Jpan" typeface="ＭＳ Ｐゴシック"/>
+        <a:font script="Hang" typeface="맑은 고딕"/>
+        <a:font script="Hans" typeface="宋体"/>
+        <a:font script="Hant" typeface="新細明體"/>
+        <a:font script="Arab" typeface="Times New Roman"/>
+        <a:font script="Hebr" typeface="Times New Roman"/>
+        <a:font script="Thai" typeface="Angsana New"/>
+        <a:font script="Ethi" typeface="Nyala"/>
+        <a:font script="Beng" typeface="Vrinda"/>
+        <a:font script="Gujr" typeface="Shruti"/>
+        <a:font script="Khmr" typeface="MoolBoran"/>
+        <a:font script="Knda" typeface="Tunga"/>
+        <a:font script="Guru" typeface="Raavi"/>
+        <a:font script="Cans" typeface="Euphemia"/>
+        <a:font script="Cher" typeface="Plantagenet Cherokee"/>
+        <a:font script="Yiii" typeface="Microsoft Yi Baiti"/>
+        <a:font script="Tibt" typeface="Microsoft Himalaya"/>
+        <a:font script="Thaa" typeface="MV Boli"/>
+        <a:font script="Deva" typeface="Mangal"/>
+        <a:font script="Telu" typeface="Gautami"/>
+        <a:font script="Taml" typeface="Latha"/>
+        <a:font script="Syrc" typeface="Estrangelo Edessa"/>
+        <a:font script="Orya" typeface="Kalinga"/>
+        <a:font script="Mlym" typeface="Kartika"/>
+        <a:font script="Laoo" typeface="DokChampa"/>
+        <a:font script="Sinh" typeface="Iskoola Pota"/>
+        <a:font script="Mong" typeface="Mongolian Baiti"/>
+        <a:font script="Viet" typeface="Times New Roman"/>
+        <a:font script="Uigh" typeface="Microsoft Uighur"/>
+        <a:font script="Geor" typeface="Sylfaen"/>
+      </a:majorFont>
+      <a:minorFont>
+        <a:latin typeface="Arial"/>
+        <a:ea typeface=""/>
+        <a:cs typeface=""/>
+        <a:font script="Jpan" typeface="ＭＳ Ｐゴシック"/>
+        <a:font script="Hang" typeface="맑은 고딕"/>
+        <a:font script="Hans" typeface="宋体"/>
+        <a:font script="Hant" typeface="新細明體"/>
+        <a:font script="Arab" typeface="Arial"/>
+        <a:font script="Hebr" typeface="Arial"/>
+        <a:font script="Thai" typeface="Cordia New"/>
+        <a:font script="Ethi" typeface="Nyala"/>
+        <a:font script="Beng" typeface="Vrinda"/>
+        <a:font script="Gujr" typeface="Shruti"/>
+        <a:font script="Khmr" typeface="DaunPenh"/>
+        <a:font script="Knda" typeface="Tunga"/>
+        <a:font script="Guru" typeface="Raavi"/>
+        <a:font script="Cans" typeface="Euphemia"/>
+        <a:font script="Cher" typeface="Plantagenet Cherokee"/>
+        <a:font script="Yiii" typeface="Microsoft Yi Baiti"/>
+        <a:font script="Tibt" typeface="Microsoft Himalaya"/>
+        <a:font script="Thaa" typeface="MV Boli"/>
+        <a:font script="Deva" typeface="Mangal"/>
+        <a:font script="Telu" typeface="Gautami"/>
+        <a:font script="Taml" typeface="Latha"/>
+        <a:font script="Syrc" typeface="Estrangelo Edessa"/>
+        <a:font script="Orya" typeface="Kalinga"/>
+        <a:font script="Mlym" typeface="Kartika"/>
+        <a:font script="Laoo" typeface="DokChampa"/>
+        <a:font script="Sinh" typeface="Iskoola Pota"/>
+        <a:font script="Mong" typeface="Mongolian Baiti"/>
+        <a:font script="Viet" typeface="Arial"/>
+        <a:font script="Uigh" typeface="Microsoft Uighur"/>
+        <a:font script="Geor" typeface="Sylfaen"/>
+      </a:minorFont>
+    </a:fontScheme>
+    <a:fmtScheme name="Office">
+      <a:fillStyleLst>
+        <a:solidFill>
+          <a:schemeClr val="phClr"/>
+        </a:solidFill>
+        <a:gradFill rotWithShape="1">
+          <a:gsLst>
+            <a:gs pos="0">
+              <a:schemeClr val="phClr">
+                <a:tint val="50000"/>
+                <a:satMod val="300000"/>
+              </a:schemeClr>
+            </a:gs>
+            <a:gs pos="35000">
+              <a:schemeClr val="phClr">
+                <a:tint val="37000"/>
+                <a:satMod val="300000"/>
+              </a:schemeClr>
+            </a:gs>
+            <a:gs pos="100000">
+              <a:schemeClr val="phClr">
+                <a:tint val="15000"/>
+                <a:satMod val="350000"/>
+              </a:schemeClr>
+            </a:gs>
+          </a:gsLst>
+          <a:lin ang="16200000" scaled="1"/>
+        </a:gradFill>
+        <a:gradFill rotWithShape="1">
+          <a:gsLst>
+            <a:gs pos="0">
+              <a:schemeClr val="phClr">
+                <a:tint val="100000"/>
+                <a:shade val="100000"/>
+                <a:satMod val="130000"/>
+              </a:schemeClr>
+            </a:gs>
+            <a:gs pos="100000">
+              <a:schemeClr val="phClr">
+                <a:tint val="50000"/>
+                <a:shade val="100000"/>
+                <a:satMod val="350000"/>
+              </a:schemeClr>
+            </a:gs>
+          </a:gsLst>
+          <a:lin ang="16200000" scaled="0"/>
+        </a:gradFill>
+      </a:fillStyleLst>
+      <a:lnStyleLst>
+        <a:ln w="9525" cap="flat" cmpd="sng" algn="ctr">
+          <a:solidFill>
+            <a:schemeClr val="phClr">
+              <a:shade val="95000"/>
+              <a:satMod val="105000"/>
+            </a:schemeClr>
+          </a:solidFill>
+          <a:prstDash val="solid"/>
+        </a:ln>
+        <a:ln w="25400" cap="flat" cmpd="sng" algn="ctr">
+          <a:solidFill>
+            <a:schemeClr val="phClr"/>
+          </a:solidFill>
+          <a:prstDash val="solid"/>
+        </a:ln>
+        <a:ln w="38100" cap="flat" cmpd="sng" algn="ctr">
+          <a:solidFill>
+            <a:schemeClr val="phClr"/>
+          </a:solidFill>
+          <a:prstDash val="solid"/>
+        </a:ln>
+      </a:lnStyleLst>
+      <a:effectStyleLst>
+        <a:effectStyle>
+          <a:effectLst>
+            <a:outerShdw blurRad="40000" dist="20000" dir="5400000" rotWithShape="0">
+              <a:srgbClr val="000000">
+                <a:alpha val="38000"/>
+              </a:srgbClr>
+            </a:outerShdw>
+          </a:effectLst>
+        </a:effectStyle>
+        <a:effectStyle>
+          <a:effectLst>
+            <a:outerShdw blurRad="40000" dist="23000" dir="5400000" rotWithShape="0">
+              <a:srgbClr val="000000">
+                <a:alpha val="35000"/>
+              </a:srgbClr>
+            </a:outerShdw>
+          </a:effectLst>
+        </a:effectStyle>
+        <a:effectStyle>
+          <a:effectLst>
+            <a:outerShdw blurRad="40000" dist="23000" dir="5400000" rotWithShape="0">
+              <a:srgbClr val="000000">
+                <a:alpha val="35000"/>
+              </a:srgbClr>
+            </a:outerShdw>
+          </a:effectLst>
+          <a:scene3d>
+            <a:camera prst="orthographicFront">
+              <a:rot lat="0" lon="0" rev="0"/>
+            </a:camera>
+            <a:lightRig rig="threePt" dir="t">
+              <a:rot lat="0" lon="0" rev="1200000"/>
+            </a:lightRig>
+          </a:scene3d>
+          <a:sp3d>
+            <a:bevelT w="63500" h="25400"/>
+          </a:sp3d>
+        </a:effectStyle>
+      </a:effectStyleLst>
+      <a:bgFillStyleLst>
+        <a:solidFill>
+          <a:schemeClr val="phClr"/>
+        </a:solidFill>
+        <a:gradFill rotWithShape="1">
+          <a:gsLst>
+            <a:gs pos="0">
+              <a:schemeClr val="phClr">
+                <a:tint val="40000"/>
+                <a:satMod val="350000"/>
+              </a:schemeClr>
+            </a:gs>
+            <a:gs pos="40000">
+              <a:schemeClr val="phClr">
+                <a:tint val="45000"/>
+                <a:shade val="99000"/>
+                <a:satMod val="350000"/>
+              </a:schemeClr>
+            </a:gs>
+            <a:gs pos="100000">
+              <a:schemeClr val="phClr">
+                <a:shade val="20000"/>
+                <a:satMod val="255000"/>
+              </a:schemeClr>
+            </a:gs>
+          </a:gsLst>
+          <a:path path="circle">
+            <a:fillToRect l="50000" t="-80000" r="50000" b="180000"/>
+          </a:path>
+        </a:gradFill>
+        <a:gradFill rotWithShape="1">
+          <a:gsLst>
+            <a:gs pos="0">
+              <a:schemeClr val="phClr">
+                <a:tint val="80000"/>
+                <a:satMod val="300000"/>
+              </a:schemeClr>
+            </a:gs>
+            <a:gs pos="100000">
+              <a:schemeClr val="phClr">
+                <a:shade val="30000"/>
+                <a:satMod val="200000"/>
+              </a:schemeClr>
+            </a:gs>
+          </a:gsLst>
+          <a:path path="circle">
+            <a:fillToRect l="50000" t="50000" r="50000" b="50000"/>
+          </a:path>
+        </a:gradFill>
+      </a:bgFillStyleLst>
+    </a:fmtScheme>
+  </a:themeElements>
+</a:theme>
 </file>
</xml_diff>

<commit_message>
Add HD images to presentation
</commit_message>
<xml_diff>
--- a/exercise2/Exercise_02_Presentation.pptx
+++ b/exercise2/Exercise_02_Presentation.pptx
@@ -20271,7 +20271,7 @@
             <a:tbl>
               <a:tblPr bandRow="1">
                 <a:noFill/>
-                <a:tableStyleId>{005D6389-D646-42F0-8AE2-6561EDAFA78D}</a:tableStyleId>
+                <a:tableStyleId>{C36FCA0A-8D9B-40A2-9645-7C92E2DE4F55}</a:tableStyleId>
               </a:tblPr>
               <a:tblGrid>
                 <a:gridCol w="1948125"/>
@@ -21220,8 +21220,8 @@
         </p:blipFill>
         <p:spPr>
           <a:xfrm>
-            <a:off x="442262" y="162738"/>
-            <a:ext cx="8259475" cy="4818024"/>
+            <a:off x="881700" y="139963"/>
+            <a:ext cx="7380600" cy="4863576"/>
           </a:xfrm>
           <a:prstGeom prst="rect">
             <a:avLst/>
@@ -21358,8 +21358,8 @@
         </p:blipFill>
         <p:spPr>
           <a:xfrm>
-            <a:off x="442762" y="163350"/>
-            <a:ext cx="8258400" cy="4816799"/>
+            <a:off x="881999" y="139950"/>
+            <a:ext cx="7379999" cy="4863599"/>
           </a:xfrm>
           <a:prstGeom prst="rect">
             <a:avLst/>
@@ -21496,8 +21496,8 @@
         </p:blipFill>
         <p:spPr>
           <a:xfrm>
-            <a:off x="442811" y="163350"/>
-            <a:ext cx="8258400" cy="4816799"/>
+            <a:off x="882002" y="139950"/>
+            <a:ext cx="7379999" cy="4863599"/>
           </a:xfrm>
           <a:prstGeom prst="rect">
             <a:avLst/>
@@ -21634,8 +21634,8 @@
         </p:blipFill>
         <p:spPr>
           <a:xfrm>
-            <a:off x="442811" y="163350"/>
-            <a:ext cx="8258400" cy="4816799"/>
+            <a:off x="881952" y="139950"/>
+            <a:ext cx="7379999" cy="4863599"/>
           </a:xfrm>
           <a:prstGeom prst="rect">
             <a:avLst/>
@@ -21712,7 +21712,7 @@
             </a:pPr>
             <a:r>
               <a:rPr lang="tr"/>
-              <a:t>MockUp</a:t>
+              <a:t>Pretty MockUp</a:t>
             </a:r>
             <a:endParaRPr/>
           </a:p>
@@ -21883,8 +21883,8 @@
         </p:blipFill>
         <p:spPr>
           <a:xfrm>
-            <a:off x="670213" y="377026"/>
-            <a:ext cx="7803475" cy="4389449"/>
+            <a:off x="648250" y="364662"/>
+            <a:ext cx="7847400" cy="4414176"/>
           </a:xfrm>
           <a:prstGeom prst="rect">
             <a:avLst/>
@@ -21904,9 +21904,9 @@
 </file>
 
 <file path=ppt/theme/theme1.xml><?xml version="1.0" encoding="utf-8"?>
-<a:theme xmlns:a="http://schemas.openxmlformats.org/drawingml/2006/main" xmlns:r="http://schemas.openxmlformats.org/officeDocument/2006/relationships" name="Colis">
+<a:theme xmlns:a="http://schemas.openxmlformats.org/drawingml/2006/main" xmlns:r="http://schemas.openxmlformats.org/officeDocument/2006/relationships" name="Simple Light">
   <a:themeElements>
-    <a:clrScheme name="Office">
+    <a:clrScheme name="Simple Light">
       <a:dk1>
         <a:srgbClr val="000000"/>
       </a:dk1>
@@ -21914,34 +21914,34 @@
         <a:srgbClr val="FFFFFF"/>
       </a:lt1>
       <a:dk2>
-        <a:srgbClr val="44546A"/>
+        <a:srgbClr val="595959"/>
       </a:dk2>
       <a:lt2>
-        <a:srgbClr val="E7E6E6"/>
+        <a:srgbClr val="EEEEEE"/>
       </a:lt2>
       <a:accent1>
-        <a:srgbClr val="4472C4"/>
+        <a:srgbClr val="FFAB40"/>
       </a:accent1>
       <a:accent2>
-        <a:srgbClr val="ED7D31"/>
+        <a:srgbClr val="212121"/>
       </a:accent2>
       <a:accent3>
-        <a:srgbClr val="A5A5A5"/>
+        <a:srgbClr val="78909C"/>
       </a:accent3>
       <a:accent4>
-        <a:srgbClr val="FFC000"/>
+        <a:srgbClr val="FFAB40"/>
       </a:accent4>
       <a:accent5>
-        <a:srgbClr val="5B9BD5"/>
+        <a:srgbClr val="0097A7"/>
       </a:accent5>
       <a:accent6>
-        <a:srgbClr val="70AD47"/>
+        <a:srgbClr val="EEFF41"/>
       </a:accent6>
       <a:hlink>
-        <a:srgbClr val="0563C1"/>
+        <a:srgbClr val="0097A7"/>
       </a:hlink>
       <a:folHlink>
-        <a:srgbClr val="954F72"/>
+        <a:srgbClr val="0097A7"/>
       </a:folHlink>
     </a:clrScheme>
     <a:fontScheme name="Office">
@@ -22183,9 +22183,9 @@
 </file>
 
 <file path=ppt/theme/theme2.xml><?xml version="1.0" encoding="utf-8"?>
-<a:theme xmlns:a="http://schemas.openxmlformats.org/drawingml/2006/main" xmlns:r="http://schemas.openxmlformats.org/officeDocument/2006/relationships">
+<a:theme xmlns:a="http://schemas.openxmlformats.org/drawingml/2006/main" xmlns:r="http://schemas.openxmlformats.org/officeDocument/2006/relationships" name="Colis">
   <a:themeElements>
-    <a:clrScheme name="Default">
+    <a:clrScheme name="Office">
       <a:dk1>
         <a:srgbClr val="000000"/>
       </a:dk1>
@@ -22193,34 +22193,34 @@
         <a:srgbClr val="FFFFFF"/>
       </a:lt1>
       <a:dk2>
-        <a:srgbClr val="158158"/>
+        <a:srgbClr val="44546A"/>
       </a:dk2>
       <a:lt2>
-        <a:srgbClr val="F3F3F3"/>
+        <a:srgbClr val="E7E6E6"/>
       </a:lt2>
       <a:accent1>
-        <a:srgbClr val="058DC7"/>
+        <a:srgbClr val="4472C4"/>
       </a:accent1>
       <a:accent2>
-        <a:srgbClr val="50B432"/>
+        <a:srgbClr val="ED7D31"/>
       </a:accent2>
       <a:accent3>
-        <a:srgbClr val="ED561B"/>
+        <a:srgbClr val="A5A5A5"/>
       </a:accent3>
       <a:accent4>
-        <a:srgbClr val="EDEF00"/>
+        <a:srgbClr val="FFC000"/>
       </a:accent4>
       <a:accent5>
-        <a:srgbClr val="24CBE5"/>
+        <a:srgbClr val="5B9BD5"/>
       </a:accent5>
       <a:accent6>
-        <a:srgbClr val="64E572"/>
+        <a:srgbClr val="70AD47"/>
       </a:accent6>
       <a:hlink>
-        <a:srgbClr val="2200CC"/>
+        <a:srgbClr val="0563C1"/>
       </a:hlink>
       <a:folHlink>
-        <a:srgbClr val="551A8B"/>
+        <a:srgbClr val="954F72"/>
       </a:folHlink>
     </a:clrScheme>
     <a:fontScheme name="Office">
@@ -22741,9 +22741,9 @@
 </file>
 
 <file path=ppt/theme/theme4.xml><?xml version="1.0" encoding="utf-8"?>
-<a:theme xmlns:a="http://schemas.openxmlformats.org/drawingml/2006/main" xmlns:r="http://schemas.openxmlformats.org/officeDocument/2006/relationships" name="Simple Light">
+<a:theme xmlns:a="http://schemas.openxmlformats.org/drawingml/2006/main" xmlns:r="http://schemas.openxmlformats.org/officeDocument/2006/relationships">
   <a:themeElements>
-    <a:clrScheme name="Simple Light">
+    <a:clrScheme name="Default">
       <a:dk1>
         <a:srgbClr val="000000"/>
       </a:dk1>
@@ -22751,34 +22751,34 @@
         <a:srgbClr val="FFFFFF"/>
       </a:lt1>
       <a:dk2>
-        <a:srgbClr val="595959"/>
+        <a:srgbClr val="158158"/>
       </a:dk2>
       <a:lt2>
-        <a:srgbClr val="EEEEEE"/>
+        <a:srgbClr val="F3F3F3"/>
       </a:lt2>
       <a:accent1>
-        <a:srgbClr val="FFAB40"/>
+        <a:srgbClr val="058DC7"/>
       </a:accent1>
       <a:accent2>
-        <a:srgbClr val="212121"/>
+        <a:srgbClr val="50B432"/>
       </a:accent2>
       <a:accent3>
-        <a:srgbClr val="78909C"/>
+        <a:srgbClr val="ED561B"/>
       </a:accent3>
       <a:accent4>
-        <a:srgbClr val="FFAB40"/>
+        <a:srgbClr val="EDEF00"/>
       </a:accent4>
       <a:accent5>
-        <a:srgbClr val="0097A7"/>
+        <a:srgbClr val="24CBE5"/>
       </a:accent5>
       <a:accent6>
-        <a:srgbClr val="EEFF41"/>
+        <a:srgbClr val="64E572"/>
       </a:accent6>
       <a:hlink>
-        <a:srgbClr val="0097A7"/>
+        <a:srgbClr val="2200CC"/>
       </a:hlink>
       <a:folHlink>
-        <a:srgbClr val="0097A7"/>
+        <a:srgbClr val="551A8B"/>
       </a:folHlink>
     </a:clrScheme>
     <a:fontScheme name="Office">

</xml_diff>